<commit_message>
switch-case Beispiel in MatLab-Syntax korrigiert
</commit_message>
<xml_diff>
--- a/MatLab-Wiederholung/Wiederholung.pptx
+++ b/MatLab-Wiederholung/Wiederholung.pptx
@@ -231,7 +231,7 @@
             <a:fld id="{8C1B5EBC-B582-499F-9414-5C4C09FC8037}" type="datetimeFigureOut">
               <a:rPr lang="de-DE" smtClean="0"/>
               <a:pPr/>
-              <a:t>14.05.2014</a:t>
+              <a:t>15.05.2014</a:t>
             </a:fld>
             <a:endParaRPr lang="de-DE"/>
           </a:p>
@@ -641,7 +641,7 @@
             <a:fld id="{95800623-0D4B-4E6D-BDC2-36DE3BDAF6E9}" type="datetime1">
               <a:rPr lang="de-DE" smtClean="0"/>
               <a:pPr/>
-              <a:t>14.05.2014</a:t>
+              <a:t>15.05.2014</a:t>
             </a:fld>
             <a:endParaRPr lang="de-DE"/>
           </a:p>
@@ -1020,7 +1020,7 @@
             <a:fld id="{8E6369E4-D3DB-49FA-BC81-4BA2AF5A1D24}" type="datetime1">
               <a:rPr lang="de-DE" smtClean="0"/>
               <a:pPr/>
-              <a:t>14.05.2014</a:t>
+              <a:t>15.05.2014</a:t>
             </a:fld>
             <a:endParaRPr lang="de-DE"/>
           </a:p>
@@ -1204,7 +1204,7 @@
             <a:fld id="{2848615D-1615-4101-9C44-F20FACBEAFF6}" type="datetime1">
               <a:rPr lang="de-DE" smtClean="0"/>
               <a:pPr/>
-              <a:t>14.05.2014</a:t>
+              <a:t>15.05.2014</a:t>
             </a:fld>
             <a:endParaRPr lang="de-DE"/>
           </a:p>
@@ -1455,7 +1455,7 @@
             <a:fld id="{B290341C-E875-4520-B517-C147063C318B}" type="datetime1">
               <a:rPr lang="de-DE" smtClean="0"/>
               <a:pPr/>
-              <a:t>14.05.2014</a:t>
+              <a:t>15.05.2014</a:t>
             </a:fld>
             <a:endParaRPr lang="de-DE" dirty="0"/>
           </a:p>
@@ -1744,7 +1744,7 @@
             <a:fld id="{E4E0269F-0D47-49C4-8954-E591C99B9743}" type="datetime1">
               <a:rPr lang="de-DE" smtClean="0"/>
               <a:pPr/>
-              <a:t>14.05.2014</a:t>
+              <a:t>15.05.2014</a:t>
             </a:fld>
             <a:endParaRPr lang="de-DE"/>
           </a:p>
@@ -1984,7 +1984,7 @@
             <a:fld id="{D4AF3C81-A0CD-449A-894D-FB4DABCBD1AA}" type="datetime1">
               <a:rPr lang="de-DE" smtClean="0"/>
               <a:pPr/>
-              <a:t>14.05.2014</a:t>
+              <a:t>15.05.2014</a:t>
             </a:fld>
             <a:endParaRPr lang="de-DE"/>
           </a:p>
@@ -2356,7 +2356,7 @@
             <a:fld id="{0AF93F63-7D75-48BF-AFEF-C4881081607E}" type="datetime1">
               <a:rPr lang="de-DE" smtClean="0"/>
               <a:pPr/>
-              <a:t>14.05.2014</a:t>
+              <a:t>15.05.2014</a:t>
             </a:fld>
             <a:endParaRPr lang="de-DE"/>
           </a:p>
@@ -2604,7 +2604,7 @@
             <a:fld id="{68E09A9C-A734-48EC-B5D8-B03375AB058B}" type="datetime1">
               <a:rPr lang="de-DE" smtClean="0"/>
               <a:pPr/>
-              <a:t>14.05.2014</a:t>
+              <a:t>15.05.2014</a:t>
             </a:fld>
             <a:endParaRPr lang="de-DE"/>
           </a:p>
@@ -2760,7 +2760,7 @@
             <a:fld id="{3822E0F1-1CC0-4F7C-B03B-D6BE31342545}" type="datetime1">
               <a:rPr lang="de-DE" smtClean="0"/>
               <a:pPr/>
-              <a:t>14.05.2014</a:t>
+              <a:t>15.05.2014</a:t>
             </a:fld>
             <a:endParaRPr lang="de-DE"/>
           </a:p>
@@ -3053,7 +3053,7 @@
             <a:fld id="{D1F8E05A-205A-4CCF-B61E-9811F47ED570}" type="datetime1">
               <a:rPr lang="de-DE" smtClean="0"/>
               <a:pPr/>
-              <a:t>14.05.2014</a:t>
+              <a:t>15.05.2014</a:t>
             </a:fld>
             <a:endParaRPr lang="de-DE"/>
           </a:p>
@@ -3476,7 +3476,7 @@
             <a:fld id="{F9AFA456-A35E-4C67-90CC-2AE9D8E04405}" type="datetime1">
               <a:rPr lang="de-DE" smtClean="0"/>
               <a:pPr/>
-              <a:t>14.05.2014</a:t>
+              <a:t>15.05.2014</a:t>
             </a:fld>
             <a:endParaRPr lang="de-DE"/>
           </a:p>
@@ -3830,7 +3830,7 @@
             <a:fld id="{BB2CBCDB-1456-4B2C-8EA1-49C8BE9B4EAE}" type="datetime1">
               <a:rPr lang="de-DE" smtClean="0"/>
               <a:pPr/>
-              <a:t>14.05.2014</a:t>
+              <a:t>15.05.2014</a:t>
             </a:fld>
             <a:endParaRPr lang="de-DE" dirty="0"/>
           </a:p>
@@ -4505,7 +4505,7 @@
             <a:fld id="{B4F900AD-6DA6-4E92-AA6C-DDE97FA92512}" type="datetime1">
               <a:rPr lang="de-DE" smtClean="0"/>
               <a:pPr/>
-              <a:t>14.05.2014</a:t>
+              <a:t>15.05.2014</a:t>
             </a:fld>
             <a:endParaRPr lang="de-DE" dirty="0"/>
           </a:p>
@@ -5002,7 +5002,7 @@
             <a:fld id="{B290341C-E875-4520-B517-C147063C318B}" type="datetime1">
               <a:rPr lang="de-DE" smtClean="0"/>
               <a:pPr/>
-              <a:t>14.05.2014</a:t>
+              <a:t>15.05.2014</a:t>
             </a:fld>
             <a:endParaRPr lang="de-DE" dirty="0"/>
           </a:p>
@@ -5533,7 +5533,7 @@
             <a:fld id="{B290341C-E875-4520-B517-C147063C318B}" type="datetime1">
               <a:rPr lang="de-DE" smtClean="0"/>
               <a:pPr/>
-              <a:t>14.05.2014</a:t>
+              <a:t>15.05.2014</a:t>
             </a:fld>
             <a:endParaRPr lang="de-DE" dirty="0"/>
           </a:p>
@@ -6110,7 +6110,7 @@
             <a:fld id="{B290341C-E875-4520-B517-C147063C318B}" type="datetime1">
               <a:rPr lang="de-DE" smtClean="0"/>
               <a:pPr/>
-              <a:t>14.05.2014</a:t>
+              <a:t>15.05.2014</a:t>
             </a:fld>
             <a:endParaRPr lang="de-DE" dirty="0"/>
           </a:p>
@@ -6316,7 +6316,7 @@
             <a:fld id="{B290341C-E875-4520-B517-C147063C318B}" type="datetime1">
               <a:rPr lang="de-DE" smtClean="0"/>
               <a:pPr/>
-              <a:t>14.05.2014</a:t>
+              <a:t>15.05.2014</a:t>
             </a:fld>
             <a:endParaRPr lang="de-DE" dirty="0"/>
           </a:p>
@@ -6635,7 +6635,7 @@
             <a:fld id="{B290341C-E875-4520-B517-C147063C318B}" type="datetime1">
               <a:rPr lang="de-DE" smtClean="0"/>
               <a:pPr/>
-              <a:t>14.05.2014</a:t>
+              <a:t>15.05.2014</a:t>
             </a:fld>
             <a:endParaRPr lang="de-DE" dirty="0"/>
           </a:p>
@@ -6991,7 +6991,7 @@
             <a:fld id="{B290341C-E875-4520-B517-C147063C318B}" type="datetime1">
               <a:rPr lang="de-DE" smtClean="0"/>
               <a:pPr/>
-              <a:t>14.05.2014</a:t>
+              <a:t>15.05.2014</a:t>
             </a:fld>
             <a:endParaRPr lang="de-DE" dirty="0"/>
           </a:p>
@@ -7302,7 +7302,7 @@
             <a:fld id="{B290341C-E875-4520-B517-C147063C318B}" type="datetime1">
               <a:rPr lang="de-DE" smtClean="0"/>
               <a:pPr/>
-              <a:t>14.05.2014</a:t>
+              <a:t>15.05.2014</a:t>
             </a:fld>
             <a:endParaRPr lang="de-DE" dirty="0"/>
           </a:p>
@@ -7678,7 +7678,7 @@
             <a:fld id="{B290341C-E875-4520-B517-C147063C318B}" type="datetime1">
               <a:rPr lang="de-DE" smtClean="0"/>
               <a:pPr/>
-              <a:t>14.05.2014</a:t>
+              <a:t>15.05.2014</a:t>
             </a:fld>
             <a:endParaRPr lang="de-DE" dirty="0"/>
           </a:p>
@@ -8058,7 +8058,7 @@
             <a:fld id="{B290341C-E875-4520-B517-C147063C318B}" type="datetime1">
               <a:rPr lang="de-DE" smtClean="0"/>
               <a:pPr/>
-              <a:t>14.05.2014</a:t>
+              <a:t>15.05.2014</a:t>
             </a:fld>
             <a:endParaRPr lang="de-DE" dirty="0"/>
           </a:p>
@@ -8420,7 +8420,7 @@
             <a:fld id="{EB7BCF64-8B73-4A04-A549-2E6D6EFA84A8}" type="datetime1">
               <a:rPr lang="de-DE" smtClean="0"/>
               <a:pPr/>
-              <a:t>14.05.2014</a:t>
+              <a:t>15.05.2014</a:t>
             </a:fld>
             <a:endParaRPr lang="de-DE" dirty="0"/>
           </a:p>
@@ -8514,7 +8514,6 @@
               <a:rPr lang="de-DE" dirty="0" smtClean="0"/>
               <a:t> Ausdrücke</a:t>
             </a:r>
-            <a:endParaRPr lang="de-DE" dirty="0" smtClean="0"/>
           </a:p>
           <a:p>
             <a:pPr>
@@ -8659,7 +8658,7 @@
             <a:fld id="{B290341C-E875-4520-B517-C147063C318B}" type="datetime1">
               <a:rPr lang="de-DE" smtClean="0"/>
               <a:pPr/>
-              <a:t>14.05.2014</a:t>
+              <a:t>15.05.2014</a:t>
             </a:fld>
             <a:endParaRPr lang="de-DE" dirty="0"/>
           </a:p>
@@ -9053,7 +9052,7 @@
             <a:fld id="{B290341C-E875-4520-B517-C147063C318B}" type="datetime1">
               <a:rPr lang="de-DE" smtClean="0"/>
               <a:pPr/>
-              <a:t>14.05.2014</a:t>
+              <a:t>15.05.2014</a:t>
             </a:fld>
             <a:endParaRPr lang="de-DE" dirty="0"/>
           </a:p>
@@ -9226,7 +9225,7 @@
             <a:fld id="{B290341C-E875-4520-B517-C147063C318B}" type="datetime1">
               <a:rPr lang="de-DE" smtClean="0"/>
               <a:pPr/>
-              <a:t>14.05.2014</a:t>
+              <a:t>15.05.2014</a:t>
             </a:fld>
             <a:endParaRPr lang="de-DE" dirty="0"/>
           </a:p>
@@ -9768,7 +9767,7 @@
             <a:fld id="{8A6F6572-D852-47A0-9C06-26217B35BEBA}" type="datetime1">
               <a:rPr lang="de-DE" smtClean="0"/>
               <a:pPr/>
-              <a:t>14.05.2014</a:t>
+              <a:t>15.05.2014</a:t>
             </a:fld>
             <a:endParaRPr lang="de-DE" dirty="0"/>
           </a:p>
@@ -10088,7 +10087,7 @@
             <a:fld id="{B290341C-E875-4520-B517-C147063C318B}" type="datetime1">
               <a:rPr lang="de-DE" smtClean="0"/>
               <a:pPr/>
-              <a:t>14.05.2014</a:t>
+              <a:t>15.05.2014</a:t>
             </a:fld>
             <a:endParaRPr lang="de-DE" dirty="0"/>
           </a:p>
@@ -10300,7 +10299,7 @@
             <a:fld id="{6EA98DF9-3660-480E-9250-58B94F61E9F2}" type="datetime1">
               <a:rPr lang="de-DE" smtClean="0"/>
               <a:pPr/>
-              <a:t>14.05.2014</a:t>
+              <a:t>15.05.2014</a:t>
             </a:fld>
             <a:endParaRPr lang="de-DE" dirty="0"/>
           </a:p>
@@ -10662,7 +10661,7 @@
             <a:fld id="{6EA98DF9-3660-480E-9250-58B94F61E9F2}" type="datetime1">
               <a:rPr lang="de-DE" smtClean="0"/>
               <a:pPr/>
-              <a:t>14.05.2014</a:t>
+              <a:t>15.05.2014</a:t>
             </a:fld>
             <a:endParaRPr lang="de-DE" dirty="0"/>
           </a:p>
@@ -10924,8 +10923,25 @@
                 <a:latin typeface="Courier New" pitchFamily="49" charset="0"/>
                 <a:cs typeface="Courier New" pitchFamily="49" charset="0"/>
               </a:rPr>
-              <a:t>  andernfalls</a:t>
-            </a:r>
+              <a:t>  </a:t>
+            </a:r>
+            <a:r>
+              <a:rPr lang="de-DE" sz="2000" dirty="0" err="1" smtClean="0">
+                <a:solidFill>
+                  <a:schemeClr val="tx1"/>
+                </a:solidFill>
+                <a:latin typeface="Courier New" pitchFamily="49" charset="0"/>
+                <a:cs typeface="Courier New" pitchFamily="49" charset="0"/>
+              </a:rPr>
+              <a:t>otherwise</a:t>
+            </a:r>
+            <a:endParaRPr lang="de-DE" sz="2000" dirty="0" smtClean="0">
+              <a:solidFill>
+                <a:schemeClr val="tx1"/>
+              </a:solidFill>
+              <a:latin typeface="Courier New" pitchFamily="49" charset="0"/>
+              <a:cs typeface="Courier New" pitchFamily="49" charset="0"/>
+            </a:endParaRPr>
           </a:p>
           <a:p>
             <a:pPr>
@@ -11042,7 +11058,7 @@
             <a:fld id="{6EA98DF9-3660-480E-9250-58B94F61E9F2}" type="datetime1">
               <a:rPr lang="de-DE" smtClean="0"/>
               <a:pPr/>
-              <a:t>14.05.2014</a:t>
+              <a:t>15.05.2014</a:t>
             </a:fld>
             <a:endParaRPr lang="de-DE" dirty="0"/>
           </a:p>
@@ -11455,8 +11471,25 @@
                 <a:latin typeface="Courier New" pitchFamily="49" charset="0"/>
                 <a:cs typeface="Courier New" pitchFamily="49" charset="0"/>
               </a:rPr>
-              <a:t>  andernfalls</a:t>
-            </a:r>
+              <a:t>  </a:t>
+            </a:r>
+            <a:r>
+              <a:rPr lang="de-DE" sz="2000" dirty="0" err="1" smtClean="0">
+                <a:solidFill>
+                  <a:schemeClr val="tx1"/>
+                </a:solidFill>
+                <a:latin typeface="Courier New" pitchFamily="49" charset="0"/>
+                <a:cs typeface="Courier New" pitchFamily="49" charset="0"/>
+              </a:rPr>
+              <a:t>otherwise</a:t>
+            </a:r>
+            <a:endParaRPr lang="de-DE" sz="2000" dirty="0" smtClean="0">
+              <a:solidFill>
+                <a:schemeClr val="tx1"/>
+              </a:solidFill>
+              <a:latin typeface="Courier New" pitchFamily="49" charset="0"/>
+              <a:cs typeface="Courier New" pitchFamily="49" charset="0"/>
+            </a:endParaRPr>
           </a:p>
           <a:p>
             <a:pPr>
@@ -11644,7 +11677,7 @@
             <a:fld id="{6EA98DF9-3660-480E-9250-58B94F61E9F2}" type="datetime1">
               <a:rPr lang="de-DE" smtClean="0"/>
               <a:pPr/>
-              <a:t>14.05.2014</a:t>
+              <a:t>15.05.2014</a:t>
             </a:fld>
             <a:endParaRPr lang="de-DE" dirty="0"/>
           </a:p>
@@ -11832,7 +11865,7 @@
             <a:fld id="{B290341C-E875-4520-B517-C147063C318B}" type="datetime1">
               <a:rPr lang="de-DE" smtClean="0"/>
               <a:pPr/>
-              <a:t>14.05.2014</a:t>
+              <a:t>15.05.2014</a:t>
             </a:fld>
             <a:endParaRPr lang="de-DE" dirty="0"/>
           </a:p>
@@ -12038,7 +12071,7 @@
             <a:fld id="{BF91387C-FC77-42DD-B355-31BEEF2DA4A7}" type="datetime1">
               <a:rPr lang="de-DE" smtClean="0"/>
               <a:pPr/>
-              <a:t>14.05.2014</a:t>
+              <a:t>15.05.2014</a:t>
             </a:fld>
             <a:endParaRPr lang="de-DE" dirty="0"/>
           </a:p>
@@ -12111,11 +12144,7 @@
             </a:pPr>
             <a:r>
               <a:rPr lang="de-DE" dirty="0" smtClean="0"/>
-              <a:t>Was habe ich heute vor</a:t>
-            </a:r>
-            <a:r>
-              <a:rPr lang="de-DE" dirty="0" smtClean="0"/>
-              <a:t>?</a:t>
+              <a:t>Was habe ich heute vor?</a:t>
             </a:r>
           </a:p>
           <a:p>
@@ -12127,7 +12156,6 @@
               <a:rPr lang="de-DE" dirty="0" smtClean="0"/>
               <a:t> Ausdrücke</a:t>
             </a:r>
-            <a:endParaRPr lang="de-DE" dirty="0" smtClean="0"/>
           </a:p>
           <a:p>
             <a:r>
@@ -12255,7 +12283,7 @@
             <a:fld id="{084AFBB8-4158-47F1-AF32-0FE1CB4C2389}" type="datetime1">
               <a:rPr lang="de-DE" smtClean="0"/>
               <a:pPr/>
-              <a:t>14.05.2014</a:t>
+              <a:t>15.05.2014</a:t>
             </a:fld>
             <a:endParaRPr lang="de-DE" dirty="0"/>
           </a:p>
@@ -12436,7 +12464,7 @@
             <a:fld id="{084AFBB8-4158-47F1-AF32-0FE1CB4C2389}" type="datetime1">
               <a:rPr lang="de-DE" smtClean="0"/>
               <a:pPr/>
-              <a:t>14.05.2014</a:t>
+              <a:t>15.05.2014</a:t>
             </a:fld>
             <a:endParaRPr lang="de-DE" dirty="0"/>
           </a:p>
@@ -12970,7 +12998,7 @@
             <a:fld id="{084AFBB8-4158-47F1-AF32-0FE1CB4C2389}" type="datetime1">
               <a:rPr lang="de-DE" smtClean="0"/>
               <a:pPr/>
-              <a:t>14.05.2014</a:t>
+              <a:t>15.05.2014</a:t>
             </a:fld>
             <a:endParaRPr lang="de-DE" dirty="0"/>
           </a:p>
@@ -13679,7 +13707,7 @@
             <a:fld id="{D0A99D10-B9FA-4E6D-B0A1-671676D32A68}" type="datetime1">
               <a:rPr lang="de-DE" smtClean="0"/>
               <a:pPr/>
-              <a:t>14.05.2014</a:t>
+              <a:t>15.05.2014</a:t>
             </a:fld>
             <a:endParaRPr lang="de-DE" dirty="0"/>
           </a:p>
@@ -13860,7 +13888,7 @@
             <a:fld id="{084AFBB8-4158-47F1-AF32-0FE1CB4C2389}" type="datetime1">
               <a:rPr lang="de-DE" smtClean="0"/>
               <a:pPr/>
-              <a:t>14.05.2014</a:t>
+              <a:t>15.05.2014</a:t>
             </a:fld>
             <a:endParaRPr lang="de-DE" dirty="0"/>
           </a:p>
@@ -14299,7 +14327,7 @@
             <a:fld id="{084AFBB8-4158-47F1-AF32-0FE1CB4C2389}" type="datetime1">
               <a:rPr lang="de-DE" smtClean="0"/>
               <a:pPr/>
-              <a:t>14.05.2014</a:t>
+              <a:t>15.05.2014</a:t>
             </a:fld>
             <a:endParaRPr lang="de-DE" dirty="0"/>
           </a:p>
@@ -14828,7 +14856,7 @@
             <a:fld id="{7C22D35C-FB7C-4E8D-A531-1BDEEBD0C0EE}" type="datetime1">
               <a:rPr lang="de-DE" smtClean="0"/>
               <a:pPr/>
-              <a:t>14.05.2014</a:t>
+              <a:t>15.05.2014</a:t>
             </a:fld>
             <a:endParaRPr lang="de-DE" dirty="0"/>
           </a:p>
@@ -15029,7 +15057,7 @@
             <a:fld id="{FC430447-D9EB-489D-B384-86BFC124314C}" type="datetime1">
               <a:rPr lang="de-DE" smtClean="0"/>
               <a:pPr/>
-              <a:t>14.05.2014</a:t>
+              <a:t>15.05.2014</a:t>
             </a:fld>
             <a:endParaRPr lang="de-DE" dirty="0"/>
           </a:p>
@@ -15374,7 +15402,7 @@
             <a:fld id="{453C06CB-442D-4748-AE34-25E7F74B8047}" type="datetime1">
               <a:rPr lang="de-DE" smtClean="0"/>
               <a:pPr/>
-              <a:t>14.05.2014</a:t>
+              <a:t>15.05.2014</a:t>
             </a:fld>
             <a:endParaRPr lang="de-DE" dirty="0"/>
           </a:p>
@@ -15552,7 +15580,7 @@
             <a:fld id="{0DE10BCB-7336-4759-BC0F-6F24C7137092}" type="datetime1">
               <a:rPr lang="de-DE" smtClean="0"/>
               <a:pPr/>
-              <a:t>14.05.2014</a:t>
+              <a:t>15.05.2014</a:t>
             </a:fld>
             <a:endParaRPr lang="de-DE" dirty="0"/>
           </a:p>
@@ -15835,7 +15863,7 @@
             <a:fld id="{0DE10BCB-7336-4759-BC0F-6F24C7137092}" type="datetime1">
               <a:rPr lang="de-DE" smtClean="0"/>
               <a:pPr/>
-              <a:t>14.05.2014</a:t>
+              <a:t>15.05.2014</a:t>
             </a:fld>
             <a:endParaRPr lang="de-DE" dirty="0"/>
           </a:p>
@@ -16039,7 +16067,7 @@
             <a:fld id="{0DE10BCB-7336-4759-BC0F-6F24C7137092}" type="datetime1">
               <a:rPr lang="de-DE" smtClean="0"/>
               <a:pPr/>
-              <a:t>14.05.2014</a:t>
+              <a:t>15.05.2014</a:t>
             </a:fld>
             <a:endParaRPr lang="de-DE" dirty="0"/>
           </a:p>
@@ -16141,7 +16169,6 @@
               <a:rPr lang="de-DE" dirty="0" smtClean="0"/>
               <a:t>Kleiner (gleich) (&lt;=)</a:t>
             </a:r>
-            <a:endParaRPr lang="de-DE" dirty="0" smtClean="0"/>
           </a:p>
           <a:p>
             <a:r>
@@ -16258,7 +16285,7 @@
             <a:fld id="{0DE10BCB-7336-4759-BC0F-6F24C7137092}" type="datetime1">
               <a:rPr lang="de-DE" smtClean="0"/>
               <a:pPr/>
-              <a:t>14.05.2014</a:t>
+              <a:t>15.05.2014</a:t>
             </a:fld>
             <a:endParaRPr lang="de-DE" dirty="0"/>
           </a:p>
@@ -16377,7 +16404,6 @@
               <a:rPr lang="de-DE" dirty="0" smtClean="0"/>
               <a:t>…</a:t>
             </a:r>
-            <a:endParaRPr lang="de-DE" dirty="0" smtClean="0"/>
           </a:p>
         </p:txBody>
       </p:sp>
@@ -16461,7 +16487,7 @@
             <a:fld id="{0DE10BCB-7336-4759-BC0F-6F24C7137092}" type="datetime1">
               <a:rPr lang="de-DE" smtClean="0"/>
               <a:pPr/>
-              <a:t>14.05.2014</a:t>
+              <a:t>15.05.2014</a:t>
             </a:fld>
             <a:endParaRPr lang="de-DE" dirty="0"/>
           </a:p>
@@ -16566,15 +16592,7 @@
             <a:pPr lvl="1"/>
             <a:r>
               <a:rPr lang="de-DE" dirty="0" smtClean="0"/>
-              <a:t>(wahr || </a:t>
-            </a:r>
-            <a:r>
-              <a:rPr lang="de-DE" dirty="0" smtClean="0"/>
-              <a:t>falsch) </a:t>
-            </a:r>
-            <a:r>
-              <a:rPr lang="de-DE" dirty="0" smtClean="0"/>
-              <a:t>== </a:t>
+              <a:t>(wahr || falsch) == </a:t>
             </a:r>
             <a:r>
               <a:rPr lang="de-DE" dirty="0" smtClean="0">
@@ -16591,11 +16609,7 @@
             <a:pPr lvl="1"/>
             <a:r>
               <a:rPr lang="de-DE" dirty="0" smtClean="0"/>
-              <a:t>(falsch </a:t>
-            </a:r>
-            <a:r>
-              <a:rPr lang="de-DE" dirty="0" smtClean="0"/>
-              <a:t>|| wahr) == </a:t>
+              <a:t>(falsch || wahr) == </a:t>
             </a:r>
             <a:r>
               <a:rPr lang="de-DE" dirty="0" smtClean="0">
@@ -16612,19 +16626,7 @@
             <a:pPr lvl="1"/>
             <a:r>
               <a:rPr lang="de-DE" dirty="0" smtClean="0"/>
-              <a:t>(falsch </a:t>
-            </a:r>
-            <a:r>
-              <a:rPr lang="de-DE" dirty="0" smtClean="0"/>
-              <a:t>|| </a:t>
-            </a:r>
-            <a:r>
-              <a:rPr lang="de-DE" dirty="0" smtClean="0"/>
-              <a:t>falsch) </a:t>
-            </a:r>
-            <a:r>
-              <a:rPr lang="de-DE" dirty="0" smtClean="0"/>
-              <a:t>== </a:t>
+              <a:t>(falsch || falsch) == </a:t>
             </a:r>
             <a:r>
               <a:rPr lang="de-DE" dirty="0" smtClean="0">
@@ -16634,11 +16636,6 @@
               </a:rPr>
               <a:t>falsch</a:t>
             </a:r>
-            <a:endParaRPr lang="de-DE" dirty="0" smtClean="0">
-              <a:solidFill>
-                <a:srgbClr val="C76563"/>
-              </a:solidFill>
-            </a:endParaRPr>
           </a:p>
           <a:p>
             <a:r>
@@ -16650,15 +16647,7 @@
             <a:pPr lvl="1"/>
             <a:r>
               <a:rPr lang="de-DE" dirty="0" smtClean="0"/>
-              <a:t>(wahr </a:t>
-            </a:r>
-            <a:r>
-              <a:rPr lang="de-DE" dirty="0" smtClean="0"/>
-              <a:t>x| wahr</a:t>
-            </a:r>
-            <a:r>
-              <a:rPr lang="de-DE" dirty="0" smtClean="0"/>
-              <a:t>) == </a:t>
+              <a:t>(wahr x| wahr) == </a:t>
             </a:r>
             <a:r>
               <a:rPr lang="de-DE" dirty="0" smtClean="0">
@@ -16668,25 +16657,12 @@
               </a:rPr>
               <a:t>falsch</a:t>
             </a:r>
-            <a:endParaRPr lang="de-DE" dirty="0" smtClean="0">
-              <a:solidFill>
-                <a:srgbClr val="C76563"/>
-              </a:solidFill>
-            </a:endParaRPr>
           </a:p>
           <a:p>
             <a:pPr lvl="1"/>
             <a:r>
               <a:rPr lang="de-DE" dirty="0" smtClean="0"/>
-              <a:t>(wahr </a:t>
-            </a:r>
-            <a:r>
-              <a:rPr lang="de-DE" dirty="0" smtClean="0"/>
-              <a:t>x| </a:t>
-            </a:r>
-            <a:r>
-              <a:rPr lang="de-DE" dirty="0" smtClean="0"/>
-              <a:t>falsch) == </a:t>
+              <a:t>(wahr x| falsch) == </a:t>
             </a:r>
             <a:r>
               <a:rPr lang="de-DE" dirty="0" smtClean="0">
@@ -16703,15 +16679,7 @@
             <a:pPr lvl="1"/>
             <a:r>
               <a:rPr lang="de-DE" dirty="0" smtClean="0"/>
-              <a:t>(falsch </a:t>
-            </a:r>
-            <a:r>
-              <a:rPr lang="de-DE" dirty="0" smtClean="0"/>
-              <a:t>x| </a:t>
-            </a:r>
-            <a:r>
-              <a:rPr lang="de-DE" dirty="0" smtClean="0"/>
-              <a:t>wahr) == </a:t>
+              <a:t>(falsch x| wahr) == </a:t>
             </a:r>
             <a:r>
               <a:rPr lang="de-DE" dirty="0" smtClean="0">
@@ -16728,15 +16696,7 @@
             <a:pPr lvl="1"/>
             <a:r>
               <a:rPr lang="de-DE" dirty="0" smtClean="0"/>
-              <a:t>(falsch </a:t>
-            </a:r>
-            <a:r>
-              <a:rPr lang="de-DE" dirty="0" smtClean="0"/>
-              <a:t>x| </a:t>
-            </a:r>
-            <a:r>
-              <a:rPr lang="de-DE" dirty="0" smtClean="0"/>
-              <a:t>falsch) == </a:t>
+              <a:t>(falsch x| falsch) == </a:t>
             </a:r>
             <a:r>
               <a:rPr lang="de-DE" dirty="0" smtClean="0">

</xml_diff>

<commit_message>
In Arbeit: - Beispiel Fakultät
</commit_message>
<xml_diff>
--- a/MatLab-Wiederholung/Wiederholung.pptx
+++ b/MatLab-Wiederholung/Wiederholung.pptx
@@ -5,7 +5,7 @@
     <p:sldMasterId id="2147483660" r:id="rId1"/>
   </p:sldMasterIdLst>
   <p:notesMasterIdLst>
-    <p:notesMasterId r:id="rId41"/>
+    <p:notesMasterId r:id="rId43"/>
   </p:notesMasterIdLst>
   <p:sldIdLst>
     <p:sldId id="256" r:id="rId2"/>
@@ -45,8 +45,10 @@
     <p:sldId id="299" r:id="rId36"/>
     <p:sldId id="274" r:id="rId37"/>
     <p:sldId id="275" r:id="rId38"/>
-    <p:sldId id="265" r:id="rId39"/>
-    <p:sldId id="266" r:id="rId40"/>
+    <p:sldId id="304" r:id="rId39"/>
+    <p:sldId id="305" r:id="rId40"/>
+    <p:sldId id="265" r:id="rId41"/>
+    <p:sldId id="266" r:id="rId42"/>
   </p:sldIdLst>
   <p:sldSz cx="9144000" cy="6858000" type="screen4x3"/>
   <p:notesSz cx="6858000" cy="9144000"/>
@@ -15209,22 +15211,22 @@
       </p:grpSpPr>
       <p:sp>
         <p:nvSpPr>
-          <p:cNvPr id="4" name="Titel 3"/>
-          <p:cNvSpPr>
-            <a:spLocks noGrp="1"/>
-          </p:cNvSpPr>
-          <p:nvPr>
-            <p:ph type="ctrTitle"/>
-          </p:nvPr>
-        </p:nvSpPr>
-        <p:spPr/>
-        <p:txBody>
-          <a:bodyPr/>
-          <a:lstStyle/>
-          <a:p>
-            <a:r>
-              <a:rPr lang="de-DE" dirty="0" smtClean="0"/>
-              <a:t>Offene Fragen?</a:t>
+          <p:cNvPr id="2" name="Titel 1"/>
+          <p:cNvSpPr>
+            <a:spLocks noGrp="1"/>
+          </p:cNvSpPr>
+          <p:nvPr>
+            <p:ph type="title"/>
+          </p:nvPr>
+        </p:nvSpPr>
+        <p:spPr/>
+        <p:txBody>
+          <a:bodyPr/>
+          <a:lstStyle/>
+          <a:p>
+            <a:r>
+              <a:rPr lang="de-DE" dirty="0" smtClean="0"/>
+              <a:t>Beispiel: Fakultät</a:t>
             </a:r>
             <a:endParaRPr lang="de-DE" dirty="0"/>
           </a:p>
@@ -15232,20 +15234,219 @@
       </p:sp>
       <p:sp>
         <p:nvSpPr>
-          <p:cNvPr id="6" name="Untertitel 5"/>
-          <p:cNvSpPr>
-            <a:spLocks noGrp="1"/>
-          </p:cNvSpPr>
-          <p:nvPr>
-            <p:ph type="subTitle" idx="1"/>
-          </p:nvPr>
-        </p:nvSpPr>
-        <p:spPr/>
-        <p:txBody>
-          <a:bodyPr/>
-          <a:lstStyle/>
-          <a:p>
-            <a:endParaRPr lang="de-DE"/>
+          <p:cNvPr id="3" name="Datumsplatzhalter 2"/>
+          <p:cNvSpPr>
+            <a:spLocks noGrp="1"/>
+          </p:cNvSpPr>
+          <p:nvPr>
+            <p:ph type="dt" sz="half" idx="10"/>
+          </p:nvPr>
+        </p:nvSpPr>
+        <p:spPr/>
+        <p:txBody>
+          <a:bodyPr/>
+          <a:lstStyle/>
+          <a:p>
+            <a:fld id="{B290341C-E875-4520-B517-C147063C318B}" type="datetime1">
+              <a:rPr lang="de-DE" smtClean="0"/>
+              <a:pPr/>
+              <a:t>15.05.2014</a:t>
+            </a:fld>
+            <a:endParaRPr lang="de-DE" dirty="0"/>
+          </a:p>
+        </p:txBody>
+      </p:sp>
+      <p:sp>
+        <p:nvSpPr>
+          <p:cNvPr id="4" name="Fußzeilenplatzhalter 3"/>
+          <p:cNvSpPr>
+            <a:spLocks noGrp="1"/>
+          </p:cNvSpPr>
+          <p:nvPr>
+            <p:ph type="ftr" sz="quarter" idx="11"/>
+          </p:nvPr>
+        </p:nvSpPr>
+        <p:spPr/>
+        <p:txBody>
+          <a:bodyPr/>
+          <a:lstStyle/>
+          <a:p>
+            <a:r>
+              <a:rPr lang="de-DE" smtClean="0"/>
+              <a:t>MatLab Wiederholung Teil 1</a:t>
+            </a:r>
+            <a:endParaRPr lang="de-DE" dirty="0"/>
+          </a:p>
+        </p:txBody>
+      </p:sp>
+      <p:sp>
+        <p:nvSpPr>
+          <p:cNvPr id="5" name="Foliennummernplatzhalter 4"/>
+          <p:cNvSpPr>
+            <a:spLocks noGrp="1"/>
+          </p:cNvSpPr>
+          <p:nvPr>
+            <p:ph type="sldNum" sz="quarter" idx="12"/>
+          </p:nvPr>
+        </p:nvSpPr>
+        <p:spPr/>
+        <p:txBody>
+          <a:bodyPr/>
+          <a:lstStyle/>
+          <a:p>
+            <a:fld id="{670766EF-AB88-44BD-ADD4-1855DA68AD09}" type="slidenum">
+              <a:rPr lang="de-DE" smtClean="0"/>
+              <a:pPr/>
+              <a:t>38</a:t>
+            </a:fld>
+            <a:endParaRPr lang="de-DE" dirty="0"/>
+          </a:p>
+        </p:txBody>
+      </p:sp>
+      <p:sp>
+        <p:nvSpPr>
+          <p:cNvPr id="6" name="Inhaltsplatzhalter 5"/>
+          <p:cNvSpPr>
+            <a:spLocks noGrp="1"/>
+          </p:cNvSpPr>
+          <p:nvPr>
+            <p:ph sz="quarter" idx="1"/>
+          </p:nvPr>
+        </p:nvSpPr>
+        <p:spPr/>
+        <p:txBody>
+          <a:bodyPr/>
+          <a:lstStyle/>
+          <a:p>
+            <a:pPr>
+              <a:buNone/>
+            </a:pPr>
+            <a:r>
+              <a:rPr lang="de-DE" dirty="0" smtClean="0"/>
+              <a:t>Generelles Vorgehen:</a:t>
+            </a:r>
+          </a:p>
+          <a:p>
+            <a:r>
+              <a:rPr lang="de-DE" dirty="0" smtClean="0"/>
+              <a:t>Was macht „Fakultät“?</a:t>
+            </a:r>
+          </a:p>
+          <a:p>
+            <a:pPr lvl="1"/>
+            <a:r>
+              <a:rPr lang="de-DE" dirty="0" smtClean="0"/>
+              <a:t>n! = n </a:t>
+            </a:r>
+            <a:r>
+              <a:rPr lang="de-DE" dirty="0" smtClean="0">
+                <a:latin typeface="Calibri"/>
+              </a:rPr>
+              <a:t>• </a:t>
+            </a:r>
+            <a:r>
+              <a:rPr lang="de-DE" dirty="0" smtClean="0"/>
+              <a:t>(n-1) </a:t>
+            </a:r>
+            <a:r>
+              <a:rPr lang="de-DE" dirty="0" smtClean="0">
+                <a:latin typeface="Calibri"/>
+              </a:rPr>
+              <a:t>•</a:t>
+            </a:r>
+            <a:r>
+              <a:rPr lang="de-DE" dirty="0" smtClean="0"/>
+              <a:t> (n-2) </a:t>
+            </a:r>
+            <a:r>
+              <a:rPr lang="de-DE" dirty="0" smtClean="0">
+                <a:latin typeface="Calibri"/>
+              </a:rPr>
+              <a:t>•</a:t>
+            </a:r>
+            <a:r>
+              <a:rPr lang="de-DE" dirty="0" smtClean="0"/>
+              <a:t> … </a:t>
+            </a:r>
+            <a:r>
+              <a:rPr lang="de-DE" dirty="0" smtClean="0">
+                <a:latin typeface="Calibri"/>
+              </a:rPr>
+              <a:t>•</a:t>
+            </a:r>
+            <a:r>
+              <a:rPr lang="de-DE" dirty="0" smtClean="0"/>
+              <a:t> (n-(n-1))</a:t>
+            </a:r>
+          </a:p>
+          <a:p>
+            <a:r>
+              <a:rPr lang="de-DE" dirty="0" smtClean="0"/>
+              <a:t>Auf welchem Bereich ist sie definiert?</a:t>
+            </a:r>
+          </a:p>
+          <a:p>
+            <a:pPr lvl="1"/>
+            <a:r>
+              <a:rPr lang="de-DE" dirty="0" smtClean="0"/>
+              <a:t>n </a:t>
+            </a:r>
+            <a:r>
+              <a:rPr lang="el-GR" dirty="0" smtClean="0">
+                <a:latin typeface="Calibri"/>
+              </a:rPr>
+              <a:t>ε</a:t>
+            </a:r>
+            <a:r>
+              <a:rPr lang="de-DE" dirty="0" smtClean="0">
+                <a:latin typeface="Calibri"/>
+              </a:rPr>
+              <a:t> </a:t>
+            </a:r>
+            <a:r>
+              <a:rPr lang="de-DE" dirty="0" smtClean="0">
+                <a:latin typeface="Castellar" pitchFamily="18" charset="0"/>
+              </a:rPr>
+              <a:t>N</a:t>
+            </a:r>
+            <a:r>
+              <a:rPr lang="de-DE" baseline="-25000" dirty="0" smtClean="0">
+                <a:latin typeface="Calibri" pitchFamily="34" charset="0"/>
+              </a:rPr>
+              <a:t>0</a:t>
+            </a:r>
+          </a:p>
+          <a:p>
+            <a:r>
+              <a:rPr lang="de-DE" dirty="0" smtClean="0"/>
+              <a:t>Wie ist sie an den Grenzen definiert?</a:t>
+            </a:r>
+          </a:p>
+          <a:p>
+            <a:pPr lvl="1"/>
+            <a:r>
+              <a:rPr lang="de-DE" dirty="0" smtClean="0"/>
+              <a:t>Für n = 0 gilt n! = 1</a:t>
+            </a:r>
+          </a:p>
+          <a:p>
+            <a:endParaRPr lang="de-DE" dirty="0" smtClean="0"/>
+          </a:p>
+          <a:p>
+            <a:pPr>
+              <a:buNone/>
+            </a:pPr>
+            <a:r>
+              <a:rPr lang="de-DE" dirty="0" smtClean="0"/>
+              <a:t>Ziel:</a:t>
+            </a:r>
+          </a:p>
+          <a:p>
+            <a:r>
+              <a:rPr lang="de-DE" dirty="0" smtClean="0"/>
+              <a:t>Skript, welches die Fakultät einer Zahl berechnet</a:t>
+            </a:r>
+            <a:endParaRPr lang="de-DE" dirty="0" smtClean="0"/>
           </a:p>
         </p:txBody>
       </p:sp>
@@ -15260,7 +15461,335 @@
   <p:timing>
     <p:tnLst>
       <p:par>
-        <p:cTn id="1" dur="indefinite" restart="never" nodeType="tmRoot"/>
+        <p:cTn id="1" dur="indefinite" restart="never" nodeType="tmRoot">
+          <p:childTnLst>
+            <p:seq concurrent="1" nextAc="seek">
+              <p:cTn id="2" dur="indefinite" nodeType="mainSeq">
+                <p:childTnLst>
+                  <p:par>
+                    <p:cTn id="3" fill="hold">
+                      <p:stCondLst>
+                        <p:cond delay="indefinite"/>
+                      </p:stCondLst>
+                      <p:childTnLst>
+                        <p:par>
+                          <p:cTn id="4" fill="hold">
+                            <p:stCondLst>
+                              <p:cond delay="0"/>
+                            </p:stCondLst>
+                            <p:childTnLst>
+                              <p:par>
+                                <p:cTn id="5" presetID="10" presetClass="entr" presetSubtype="0" fill="hold" nodeType="clickEffect">
+                                  <p:stCondLst>
+                                    <p:cond delay="0"/>
+                                  </p:stCondLst>
+                                  <p:childTnLst>
+                                    <p:set>
+                                      <p:cBhvr>
+                                        <p:cTn id="6" dur="1" fill="hold">
+                                          <p:stCondLst>
+                                            <p:cond delay="0"/>
+                                          </p:stCondLst>
+                                        </p:cTn>
+                                        <p:tgtEl>
+                                          <p:spTgt spid="6">
+                                            <p:txEl>
+                                              <p:pRg st="2" end="2"/>
+                                            </p:txEl>
+                                          </p:spTgt>
+                                        </p:tgtEl>
+                                        <p:attrNameLst>
+                                          <p:attrName>style.visibility</p:attrName>
+                                        </p:attrNameLst>
+                                      </p:cBhvr>
+                                      <p:to>
+                                        <p:strVal val="visible"/>
+                                      </p:to>
+                                    </p:set>
+                                    <p:animEffect transition="in" filter="fade">
+                                      <p:cBhvr>
+                                        <p:cTn id="7" dur="500"/>
+                                        <p:tgtEl>
+                                          <p:spTgt spid="6">
+                                            <p:txEl>
+                                              <p:pRg st="2" end="2"/>
+                                            </p:txEl>
+                                          </p:spTgt>
+                                        </p:tgtEl>
+                                      </p:cBhvr>
+                                    </p:animEffect>
+                                  </p:childTnLst>
+                                </p:cTn>
+                              </p:par>
+                            </p:childTnLst>
+                          </p:cTn>
+                        </p:par>
+                      </p:childTnLst>
+                    </p:cTn>
+                  </p:par>
+                  <p:par>
+                    <p:cTn id="8" fill="hold">
+                      <p:stCondLst>
+                        <p:cond delay="indefinite"/>
+                      </p:stCondLst>
+                      <p:childTnLst>
+                        <p:par>
+                          <p:cTn id="9" fill="hold">
+                            <p:stCondLst>
+                              <p:cond delay="0"/>
+                            </p:stCondLst>
+                            <p:childTnLst>
+                              <p:par>
+                                <p:cTn id="10" presetID="10" presetClass="entr" presetSubtype="0" fill="hold" nodeType="clickEffect">
+                                  <p:stCondLst>
+                                    <p:cond delay="0"/>
+                                  </p:stCondLst>
+                                  <p:childTnLst>
+                                    <p:set>
+                                      <p:cBhvr>
+                                        <p:cTn id="11" dur="1" fill="hold">
+                                          <p:stCondLst>
+                                            <p:cond delay="0"/>
+                                          </p:stCondLst>
+                                        </p:cTn>
+                                        <p:tgtEl>
+                                          <p:spTgt spid="6">
+                                            <p:txEl>
+                                              <p:pRg st="4" end="4"/>
+                                            </p:txEl>
+                                          </p:spTgt>
+                                        </p:tgtEl>
+                                        <p:attrNameLst>
+                                          <p:attrName>style.visibility</p:attrName>
+                                        </p:attrNameLst>
+                                      </p:cBhvr>
+                                      <p:to>
+                                        <p:strVal val="visible"/>
+                                      </p:to>
+                                    </p:set>
+                                    <p:animEffect transition="in" filter="fade">
+                                      <p:cBhvr>
+                                        <p:cTn id="12" dur="500"/>
+                                        <p:tgtEl>
+                                          <p:spTgt spid="6">
+                                            <p:txEl>
+                                              <p:pRg st="4" end="4"/>
+                                            </p:txEl>
+                                          </p:spTgt>
+                                        </p:tgtEl>
+                                      </p:cBhvr>
+                                    </p:animEffect>
+                                  </p:childTnLst>
+                                </p:cTn>
+                              </p:par>
+                            </p:childTnLst>
+                          </p:cTn>
+                        </p:par>
+                      </p:childTnLst>
+                    </p:cTn>
+                  </p:par>
+                  <p:par>
+                    <p:cTn id="13" fill="hold">
+                      <p:stCondLst>
+                        <p:cond delay="indefinite"/>
+                      </p:stCondLst>
+                      <p:childTnLst>
+                        <p:par>
+                          <p:cTn id="14" fill="hold">
+                            <p:stCondLst>
+                              <p:cond delay="0"/>
+                            </p:stCondLst>
+                            <p:childTnLst>
+                              <p:par>
+                                <p:cTn id="15" presetID="10" presetClass="entr" presetSubtype="0" fill="hold" nodeType="clickEffect">
+                                  <p:stCondLst>
+                                    <p:cond delay="0"/>
+                                  </p:stCondLst>
+                                  <p:childTnLst>
+                                    <p:set>
+                                      <p:cBhvr>
+                                        <p:cTn id="16" dur="1" fill="hold">
+                                          <p:stCondLst>
+                                            <p:cond delay="0"/>
+                                          </p:stCondLst>
+                                        </p:cTn>
+                                        <p:tgtEl>
+                                          <p:spTgt spid="6">
+                                            <p:txEl>
+                                              <p:pRg st="6" end="6"/>
+                                            </p:txEl>
+                                          </p:spTgt>
+                                        </p:tgtEl>
+                                        <p:attrNameLst>
+                                          <p:attrName>style.visibility</p:attrName>
+                                        </p:attrNameLst>
+                                      </p:cBhvr>
+                                      <p:to>
+                                        <p:strVal val="visible"/>
+                                      </p:to>
+                                    </p:set>
+                                    <p:animEffect transition="in" filter="fade">
+                                      <p:cBhvr>
+                                        <p:cTn id="17" dur="500"/>
+                                        <p:tgtEl>
+                                          <p:spTgt spid="6">
+                                            <p:txEl>
+                                              <p:pRg st="6" end="6"/>
+                                            </p:txEl>
+                                          </p:spTgt>
+                                        </p:tgtEl>
+                                      </p:cBhvr>
+                                    </p:animEffect>
+                                  </p:childTnLst>
+                                </p:cTn>
+                              </p:par>
+                            </p:childTnLst>
+                          </p:cTn>
+                        </p:par>
+                      </p:childTnLst>
+                    </p:cTn>
+                  </p:par>
+                  <p:par>
+                    <p:cTn id="18" fill="hold">
+                      <p:stCondLst>
+                        <p:cond delay="indefinite"/>
+                      </p:stCondLst>
+                      <p:childTnLst>
+                        <p:par>
+                          <p:cTn id="19" fill="hold">
+                            <p:stCondLst>
+                              <p:cond delay="0"/>
+                            </p:stCondLst>
+                            <p:childTnLst>
+                              <p:par>
+                                <p:cTn id="20" presetID="10" presetClass="entr" presetSubtype="0" fill="hold" nodeType="clickEffect">
+                                  <p:stCondLst>
+                                    <p:cond delay="0"/>
+                                  </p:stCondLst>
+                                  <p:childTnLst>
+                                    <p:set>
+                                      <p:cBhvr>
+                                        <p:cTn id="21" dur="1" fill="hold">
+                                          <p:stCondLst>
+                                            <p:cond delay="0"/>
+                                          </p:stCondLst>
+                                        </p:cTn>
+                                        <p:tgtEl>
+                                          <p:spTgt spid="6">
+                                            <p:txEl>
+                                              <p:pRg st="8" end="8"/>
+                                            </p:txEl>
+                                          </p:spTgt>
+                                        </p:tgtEl>
+                                        <p:attrNameLst>
+                                          <p:attrName>style.visibility</p:attrName>
+                                        </p:attrNameLst>
+                                      </p:cBhvr>
+                                      <p:to>
+                                        <p:strVal val="visible"/>
+                                      </p:to>
+                                    </p:set>
+                                    <p:animEffect transition="in" filter="fade">
+                                      <p:cBhvr>
+                                        <p:cTn id="22" dur="500"/>
+                                        <p:tgtEl>
+                                          <p:spTgt spid="6">
+                                            <p:txEl>
+                                              <p:pRg st="8" end="8"/>
+                                            </p:txEl>
+                                          </p:spTgt>
+                                        </p:tgtEl>
+                                      </p:cBhvr>
+                                    </p:animEffect>
+                                  </p:childTnLst>
+                                </p:cTn>
+                              </p:par>
+                            </p:childTnLst>
+                          </p:cTn>
+                        </p:par>
+                      </p:childTnLst>
+                    </p:cTn>
+                  </p:par>
+                  <p:par>
+                    <p:cTn id="23" fill="hold">
+                      <p:stCondLst>
+                        <p:cond delay="indefinite"/>
+                      </p:stCondLst>
+                      <p:childTnLst>
+                        <p:par>
+                          <p:cTn id="24" fill="hold">
+                            <p:stCondLst>
+                              <p:cond delay="0"/>
+                            </p:stCondLst>
+                            <p:childTnLst>
+                              <p:par>
+                                <p:cTn id="25" presetID="10" presetClass="entr" presetSubtype="0" fill="hold" nodeType="clickEffect">
+                                  <p:stCondLst>
+                                    <p:cond delay="0"/>
+                                  </p:stCondLst>
+                                  <p:childTnLst>
+                                    <p:set>
+                                      <p:cBhvr>
+                                        <p:cTn id="26" dur="1" fill="hold">
+                                          <p:stCondLst>
+                                            <p:cond delay="0"/>
+                                          </p:stCondLst>
+                                        </p:cTn>
+                                        <p:tgtEl>
+                                          <p:spTgt spid="6">
+                                            <p:txEl>
+                                              <p:pRg st="9" end="9"/>
+                                            </p:txEl>
+                                          </p:spTgt>
+                                        </p:tgtEl>
+                                        <p:attrNameLst>
+                                          <p:attrName>style.visibility</p:attrName>
+                                        </p:attrNameLst>
+                                      </p:cBhvr>
+                                      <p:to>
+                                        <p:strVal val="visible"/>
+                                      </p:to>
+                                    </p:set>
+                                    <p:animEffect transition="in" filter="fade">
+                                      <p:cBhvr>
+                                        <p:cTn id="27" dur="500"/>
+                                        <p:tgtEl>
+                                          <p:spTgt spid="6">
+                                            <p:txEl>
+                                              <p:pRg st="9" end="9"/>
+                                            </p:txEl>
+                                          </p:spTgt>
+                                        </p:tgtEl>
+                                      </p:cBhvr>
+                                    </p:animEffect>
+                                  </p:childTnLst>
+                                </p:cTn>
+                              </p:par>
+                            </p:childTnLst>
+                          </p:cTn>
+                        </p:par>
+                      </p:childTnLst>
+                    </p:cTn>
+                  </p:par>
+                </p:childTnLst>
+              </p:cTn>
+              <p:prevCondLst>
+                <p:cond evt="onPrev" delay="0">
+                  <p:tgtEl>
+                    <p:sldTgt/>
+                  </p:tgtEl>
+                </p:cond>
+              </p:prevCondLst>
+              <p:nextCondLst>
+                <p:cond evt="onNext" delay="0">
+                  <p:tgtEl>
+                    <p:sldTgt/>
+                  </p:tgtEl>
+                </p:cond>
+              </p:nextCondLst>
+            </p:seq>
+          </p:childTnLst>
+        </p:cTn>
       </p:par>
     </p:tnLst>
   </p:timing>
@@ -15291,17 +15820,25 @@
             <a:spLocks noGrp="1"/>
           </p:cNvSpPr>
           <p:nvPr>
-            <p:ph type="ctrTitle"/>
-          </p:nvPr>
-        </p:nvSpPr>
-        <p:spPr/>
-        <p:txBody>
-          <a:bodyPr/>
-          <a:lstStyle/>
-          <a:p>
-            <a:r>
-              <a:rPr lang="de-DE" dirty="0" smtClean="0"/>
-              <a:t>Danke für die Aufmerksamkeit.</a:t>
+            <p:ph type="title"/>
+          </p:nvPr>
+        </p:nvSpPr>
+        <p:spPr/>
+        <p:txBody>
+          <a:bodyPr/>
+          <a:lstStyle/>
+          <a:p>
+            <a:r>
+              <a:rPr lang="de-DE" dirty="0" smtClean="0"/>
+              <a:t>Beispiel</a:t>
+            </a:r>
+            <a:r>
+              <a:rPr lang="de-DE" smtClean="0"/>
+              <a:t>: </a:t>
+            </a:r>
+            <a:r>
+              <a:rPr lang="de-DE" smtClean="0"/>
+              <a:t>Fakultät</a:t>
             </a:r>
             <a:endParaRPr lang="de-DE" dirty="0"/>
           </a:p>
@@ -15309,20 +15846,151 @@
       </p:sp>
       <p:sp>
         <p:nvSpPr>
-          <p:cNvPr id="4" name="Untertitel 3"/>
-          <p:cNvSpPr>
-            <a:spLocks noGrp="1"/>
-          </p:cNvSpPr>
-          <p:nvPr>
-            <p:ph type="subTitle" idx="1"/>
-          </p:nvPr>
-        </p:nvSpPr>
-        <p:spPr/>
-        <p:txBody>
-          <a:bodyPr/>
-          <a:lstStyle/>
-          <a:p>
-            <a:endParaRPr lang="de-DE"/>
+          <p:cNvPr id="3" name="Datumsplatzhalter 2"/>
+          <p:cNvSpPr>
+            <a:spLocks noGrp="1"/>
+          </p:cNvSpPr>
+          <p:nvPr>
+            <p:ph type="dt" sz="half" idx="10"/>
+          </p:nvPr>
+        </p:nvSpPr>
+        <p:spPr/>
+        <p:txBody>
+          <a:bodyPr/>
+          <a:lstStyle/>
+          <a:p>
+            <a:fld id="{B290341C-E875-4520-B517-C147063C318B}" type="datetime1">
+              <a:rPr lang="de-DE" smtClean="0"/>
+              <a:pPr/>
+              <a:t>15.05.2014</a:t>
+            </a:fld>
+            <a:endParaRPr lang="de-DE" dirty="0"/>
+          </a:p>
+        </p:txBody>
+      </p:sp>
+      <p:sp>
+        <p:nvSpPr>
+          <p:cNvPr id="4" name="Fußzeilenplatzhalter 3"/>
+          <p:cNvSpPr>
+            <a:spLocks noGrp="1"/>
+          </p:cNvSpPr>
+          <p:nvPr>
+            <p:ph type="ftr" sz="quarter" idx="11"/>
+          </p:nvPr>
+        </p:nvSpPr>
+        <p:spPr/>
+        <p:txBody>
+          <a:bodyPr/>
+          <a:lstStyle/>
+          <a:p>
+            <a:r>
+              <a:rPr lang="de-DE" smtClean="0"/>
+              <a:t>MatLab Wiederholung Teil 1</a:t>
+            </a:r>
+            <a:endParaRPr lang="de-DE" dirty="0"/>
+          </a:p>
+        </p:txBody>
+      </p:sp>
+      <p:sp>
+        <p:nvSpPr>
+          <p:cNvPr id="5" name="Foliennummernplatzhalter 4"/>
+          <p:cNvSpPr>
+            <a:spLocks noGrp="1"/>
+          </p:cNvSpPr>
+          <p:nvPr>
+            <p:ph type="sldNum" sz="quarter" idx="12"/>
+          </p:nvPr>
+        </p:nvSpPr>
+        <p:spPr/>
+        <p:txBody>
+          <a:bodyPr/>
+          <a:lstStyle/>
+          <a:p>
+            <a:fld id="{670766EF-AB88-44BD-ADD4-1855DA68AD09}" type="slidenum">
+              <a:rPr lang="de-DE" smtClean="0"/>
+              <a:pPr/>
+              <a:t>39</a:t>
+            </a:fld>
+            <a:endParaRPr lang="de-DE" dirty="0"/>
+          </a:p>
+        </p:txBody>
+      </p:sp>
+      <p:sp>
+        <p:nvSpPr>
+          <p:cNvPr id="6" name="Inhaltsplatzhalter 5"/>
+          <p:cNvSpPr>
+            <a:spLocks noGrp="1"/>
+          </p:cNvSpPr>
+          <p:nvPr>
+            <p:ph sz="quarter" idx="1"/>
+          </p:nvPr>
+        </p:nvSpPr>
+        <p:spPr/>
+        <p:txBody>
+          <a:bodyPr/>
+          <a:lstStyle/>
+          <a:p>
+            <a:pPr>
+              <a:buNone/>
+            </a:pPr>
+            <a:endParaRPr lang="de-DE" dirty="0"/>
+          </a:p>
+        </p:txBody>
+      </p:sp>
+      <p:sp>
+        <p:nvSpPr>
+          <p:cNvPr id="7" name="Rechteck 6"/>
+          <p:cNvSpPr/>
+          <p:nvPr/>
+        </p:nvSpPr>
+        <p:spPr>
+          <a:xfrm>
+            <a:off x="500034" y="1214422"/>
+            <a:ext cx="8143932" cy="4929222"/>
+          </a:xfrm>
+          <a:prstGeom prst="rect">
+            <a:avLst/>
+          </a:prstGeom>
+          <a:solidFill>
+            <a:schemeClr val="accent1">
+              <a:lumMod val="20000"/>
+              <a:lumOff val="80000"/>
+            </a:schemeClr>
+          </a:solidFill>
+          <a:ln>
+            <a:noFill/>
+          </a:ln>
+        </p:spPr>
+        <p:style>
+          <a:lnRef idx="2">
+            <a:schemeClr val="accent1">
+              <a:shade val="50000"/>
+            </a:schemeClr>
+          </a:lnRef>
+          <a:fillRef idx="1">
+            <a:schemeClr val="accent1"/>
+          </a:fillRef>
+          <a:effectRef idx="0">
+            <a:schemeClr val="accent1"/>
+          </a:effectRef>
+          <a:fontRef idx="minor">
+            <a:schemeClr val="lt1"/>
+          </a:fontRef>
+        </p:style>
+        <p:txBody>
+          <a:bodyPr rtlCol="0" anchor="t" anchorCtr="0"/>
+          <a:lstStyle/>
+          <a:p>
+            <a:pPr>
+              <a:buNone/>
+            </a:pPr>
+            <a:endParaRPr lang="de-DE" sz="2000" dirty="0">
+              <a:solidFill>
+                <a:schemeClr val="tx1"/>
+              </a:solidFill>
+              <a:latin typeface="Courier New" pitchFamily="49" charset="0"/>
+              <a:cs typeface="Courier New" pitchFamily="49" charset="0"/>
+            </a:endParaRPr>
           </a:p>
         </p:txBody>
       </p:sp>
@@ -15501,6 +16169,160 @@
               <a:rPr lang="de-DE" dirty="0" smtClean="0"/>
               <a:t> selbst erklären</a:t>
             </a:r>
+          </a:p>
+        </p:txBody>
+      </p:sp>
+    </p:spTree>
+  </p:cSld>
+  <p:clrMapOvr>
+    <a:masterClrMapping/>
+  </p:clrMapOvr>
+  <p:transition>
+    <p:fade/>
+  </p:transition>
+  <p:timing>
+    <p:tnLst>
+      <p:par>
+        <p:cTn id="1" dur="indefinite" restart="never" nodeType="tmRoot"/>
+      </p:par>
+    </p:tnLst>
+  </p:timing>
+</p:sld>
+</file>
+
+<file path=ppt/slides/slide40.xml><?xml version="1.0" encoding="utf-8"?>
+<p:sld xmlns:a="http://schemas.openxmlformats.org/drawingml/2006/main" xmlns:r="http://schemas.openxmlformats.org/officeDocument/2006/relationships" xmlns:p="http://schemas.openxmlformats.org/presentationml/2006/main">
+  <p:cSld>
+    <p:spTree>
+      <p:nvGrpSpPr>
+        <p:cNvPr id="1" name=""/>
+        <p:cNvGrpSpPr/>
+        <p:nvPr/>
+      </p:nvGrpSpPr>
+      <p:grpSpPr>
+        <a:xfrm>
+          <a:off x="0" y="0"/>
+          <a:ext cx="0" cy="0"/>
+          <a:chOff x="0" y="0"/>
+          <a:chExt cx="0" cy="0"/>
+        </a:xfrm>
+      </p:grpSpPr>
+      <p:sp>
+        <p:nvSpPr>
+          <p:cNvPr id="4" name="Titel 3"/>
+          <p:cNvSpPr>
+            <a:spLocks noGrp="1"/>
+          </p:cNvSpPr>
+          <p:nvPr>
+            <p:ph type="ctrTitle"/>
+          </p:nvPr>
+        </p:nvSpPr>
+        <p:spPr/>
+        <p:txBody>
+          <a:bodyPr/>
+          <a:lstStyle/>
+          <a:p>
+            <a:r>
+              <a:rPr lang="de-DE" dirty="0" smtClean="0"/>
+              <a:t>Offene Fragen?</a:t>
+            </a:r>
+            <a:endParaRPr lang="de-DE" dirty="0"/>
+          </a:p>
+        </p:txBody>
+      </p:sp>
+      <p:sp>
+        <p:nvSpPr>
+          <p:cNvPr id="6" name="Untertitel 5"/>
+          <p:cNvSpPr>
+            <a:spLocks noGrp="1"/>
+          </p:cNvSpPr>
+          <p:nvPr>
+            <p:ph type="subTitle" idx="1"/>
+          </p:nvPr>
+        </p:nvSpPr>
+        <p:spPr/>
+        <p:txBody>
+          <a:bodyPr/>
+          <a:lstStyle/>
+          <a:p>
+            <a:endParaRPr lang="de-DE"/>
+          </a:p>
+        </p:txBody>
+      </p:sp>
+    </p:spTree>
+  </p:cSld>
+  <p:clrMapOvr>
+    <a:masterClrMapping/>
+  </p:clrMapOvr>
+  <p:transition>
+    <p:fade/>
+  </p:transition>
+  <p:timing>
+    <p:tnLst>
+      <p:par>
+        <p:cTn id="1" dur="indefinite" restart="never" nodeType="tmRoot"/>
+      </p:par>
+    </p:tnLst>
+  </p:timing>
+</p:sld>
+</file>
+
+<file path=ppt/slides/slide41.xml><?xml version="1.0" encoding="utf-8"?>
+<p:sld xmlns:a="http://schemas.openxmlformats.org/drawingml/2006/main" xmlns:r="http://schemas.openxmlformats.org/officeDocument/2006/relationships" xmlns:p="http://schemas.openxmlformats.org/presentationml/2006/main">
+  <p:cSld>
+    <p:spTree>
+      <p:nvGrpSpPr>
+        <p:cNvPr id="1" name=""/>
+        <p:cNvGrpSpPr/>
+        <p:nvPr/>
+      </p:nvGrpSpPr>
+      <p:grpSpPr>
+        <a:xfrm>
+          <a:off x="0" y="0"/>
+          <a:ext cx="0" cy="0"/>
+          <a:chOff x="0" y="0"/>
+          <a:chExt cx="0" cy="0"/>
+        </a:xfrm>
+      </p:grpSpPr>
+      <p:sp>
+        <p:nvSpPr>
+          <p:cNvPr id="2" name="Titel 1"/>
+          <p:cNvSpPr>
+            <a:spLocks noGrp="1"/>
+          </p:cNvSpPr>
+          <p:nvPr>
+            <p:ph type="ctrTitle"/>
+          </p:nvPr>
+        </p:nvSpPr>
+        <p:spPr/>
+        <p:txBody>
+          <a:bodyPr/>
+          <a:lstStyle/>
+          <a:p>
+            <a:r>
+              <a:rPr lang="de-DE" dirty="0" smtClean="0"/>
+              <a:t>Danke für die Aufmerksamkeit.</a:t>
+            </a:r>
+            <a:endParaRPr lang="de-DE" dirty="0"/>
+          </a:p>
+        </p:txBody>
+      </p:sp>
+      <p:sp>
+        <p:nvSpPr>
+          <p:cNvPr id="4" name="Untertitel 3"/>
+          <p:cNvSpPr>
+            <a:spLocks noGrp="1"/>
+          </p:cNvSpPr>
+          <p:nvPr>
+            <p:ph type="subTitle" idx="1"/>
+          </p:nvPr>
+        </p:nvSpPr>
+        <p:spPr/>
+        <p:txBody>
+          <a:bodyPr/>
+          <a:lstStyle/>
+          <a:p>
+            <a:endParaRPr lang="de-DE"/>
           </a:p>
         </p:txBody>
       </p:sp>

</xml_diff>

<commit_message>
Beispiele eingearbeitet:   - Fakultät (einfach und elegant)   - Fibonacci-Folge (einfach und elegant)
Fehler korrigiert:
  - & statt && bei Beispielien für Boolsche Ausdrücke
</commit_message>
<xml_diff>
--- a/MatLab-Wiederholung/Wiederholung.pptx
+++ b/MatLab-Wiederholung/Wiederholung.pptx
@@ -237,7 +237,7 @@
             <a:fld id="{8C1B5EBC-B582-499F-9414-5C4C09FC8037}" type="datetimeFigureOut">
               <a:rPr lang="de-DE" smtClean="0"/>
               <a:pPr/>
-              <a:t>18.05.2014</a:t>
+              <a:t>22.05.2014</a:t>
             </a:fld>
             <a:endParaRPr lang="de-DE"/>
           </a:p>
@@ -647,7 +647,7 @@
             <a:fld id="{95800623-0D4B-4E6D-BDC2-36DE3BDAF6E9}" type="datetime1">
               <a:rPr lang="de-DE" smtClean="0"/>
               <a:pPr/>
-              <a:t>18.05.2014</a:t>
+              <a:t>22.05.2014</a:t>
             </a:fld>
             <a:endParaRPr lang="de-DE"/>
           </a:p>
@@ -1026,7 +1026,7 @@
             <a:fld id="{8E6369E4-D3DB-49FA-BC81-4BA2AF5A1D24}" type="datetime1">
               <a:rPr lang="de-DE" smtClean="0"/>
               <a:pPr/>
-              <a:t>18.05.2014</a:t>
+              <a:t>22.05.2014</a:t>
             </a:fld>
             <a:endParaRPr lang="de-DE"/>
           </a:p>
@@ -1210,7 +1210,7 @@
             <a:fld id="{2848615D-1615-4101-9C44-F20FACBEAFF6}" type="datetime1">
               <a:rPr lang="de-DE" smtClean="0"/>
               <a:pPr/>
-              <a:t>18.05.2014</a:t>
+              <a:t>22.05.2014</a:t>
             </a:fld>
             <a:endParaRPr lang="de-DE"/>
           </a:p>
@@ -1461,7 +1461,7 @@
             <a:fld id="{B290341C-E875-4520-B517-C147063C318B}" type="datetime1">
               <a:rPr lang="de-DE" smtClean="0"/>
               <a:pPr/>
-              <a:t>18.05.2014</a:t>
+              <a:t>22.05.2014</a:t>
             </a:fld>
             <a:endParaRPr lang="de-DE" dirty="0"/>
           </a:p>
@@ -1750,7 +1750,7 @@
             <a:fld id="{E4E0269F-0D47-49C4-8954-E591C99B9743}" type="datetime1">
               <a:rPr lang="de-DE" smtClean="0"/>
               <a:pPr/>
-              <a:t>18.05.2014</a:t>
+              <a:t>22.05.2014</a:t>
             </a:fld>
             <a:endParaRPr lang="de-DE"/>
           </a:p>
@@ -1990,7 +1990,7 @@
             <a:fld id="{D4AF3C81-A0CD-449A-894D-FB4DABCBD1AA}" type="datetime1">
               <a:rPr lang="de-DE" smtClean="0"/>
               <a:pPr/>
-              <a:t>18.05.2014</a:t>
+              <a:t>22.05.2014</a:t>
             </a:fld>
             <a:endParaRPr lang="de-DE"/>
           </a:p>
@@ -2362,7 +2362,7 @@
             <a:fld id="{0AF93F63-7D75-48BF-AFEF-C4881081607E}" type="datetime1">
               <a:rPr lang="de-DE" smtClean="0"/>
               <a:pPr/>
-              <a:t>18.05.2014</a:t>
+              <a:t>22.05.2014</a:t>
             </a:fld>
             <a:endParaRPr lang="de-DE"/>
           </a:p>
@@ -2610,7 +2610,7 @@
             <a:fld id="{68E09A9C-A734-48EC-B5D8-B03375AB058B}" type="datetime1">
               <a:rPr lang="de-DE" smtClean="0"/>
               <a:pPr/>
-              <a:t>18.05.2014</a:t>
+              <a:t>22.05.2014</a:t>
             </a:fld>
             <a:endParaRPr lang="de-DE"/>
           </a:p>
@@ -2766,7 +2766,7 @@
             <a:fld id="{3822E0F1-1CC0-4F7C-B03B-D6BE31342545}" type="datetime1">
               <a:rPr lang="de-DE" smtClean="0"/>
               <a:pPr/>
-              <a:t>18.05.2014</a:t>
+              <a:t>22.05.2014</a:t>
             </a:fld>
             <a:endParaRPr lang="de-DE"/>
           </a:p>
@@ -3059,7 +3059,7 @@
             <a:fld id="{D1F8E05A-205A-4CCF-B61E-9811F47ED570}" type="datetime1">
               <a:rPr lang="de-DE" smtClean="0"/>
               <a:pPr/>
-              <a:t>18.05.2014</a:t>
+              <a:t>22.05.2014</a:t>
             </a:fld>
             <a:endParaRPr lang="de-DE"/>
           </a:p>
@@ -3482,7 +3482,7 @@
             <a:fld id="{F9AFA456-A35E-4C67-90CC-2AE9D8E04405}" type="datetime1">
               <a:rPr lang="de-DE" smtClean="0"/>
               <a:pPr/>
-              <a:t>18.05.2014</a:t>
+              <a:t>22.05.2014</a:t>
             </a:fld>
             <a:endParaRPr lang="de-DE"/>
           </a:p>
@@ -3836,7 +3836,7 @@
             <a:fld id="{BB2CBCDB-1456-4B2C-8EA1-49C8BE9B4EAE}" type="datetime1">
               <a:rPr lang="de-DE" smtClean="0"/>
               <a:pPr/>
-              <a:t>18.05.2014</a:t>
+              <a:t>22.05.2014</a:t>
             </a:fld>
             <a:endParaRPr lang="de-DE" dirty="0"/>
           </a:p>
@@ -4511,7 +4511,7 @@
             <a:fld id="{B4F900AD-6DA6-4E92-AA6C-DDE97FA92512}" type="datetime1">
               <a:rPr lang="de-DE" smtClean="0"/>
               <a:pPr/>
-              <a:t>18.05.2014</a:t>
+              <a:t>22.05.2014</a:t>
             </a:fld>
             <a:endParaRPr lang="de-DE" dirty="0"/>
           </a:p>
@@ -5008,7 +5008,7 @@
             <a:fld id="{B290341C-E875-4520-B517-C147063C318B}" type="datetime1">
               <a:rPr lang="de-DE" smtClean="0"/>
               <a:pPr/>
-              <a:t>18.05.2014</a:t>
+              <a:t>22.05.2014</a:t>
             </a:fld>
             <a:endParaRPr lang="de-DE" dirty="0"/>
           </a:p>
@@ -5539,7 +5539,7 @@
             <a:fld id="{B290341C-E875-4520-B517-C147063C318B}" type="datetime1">
               <a:rPr lang="de-DE" smtClean="0"/>
               <a:pPr/>
-              <a:t>18.05.2014</a:t>
+              <a:t>22.05.2014</a:t>
             </a:fld>
             <a:endParaRPr lang="de-DE" dirty="0"/>
           </a:p>
@@ -6116,7 +6116,7 @@
             <a:fld id="{B290341C-E875-4520-B517-C147063C318B}" type="datetime1">
               <a:rPr lang="de-DE" smtClean="0"/>
               <a:pPr/>
-              <a:t>18.05.2014</a:t>
+              <a:t>22.05.2014</a:t>
             </a:fld>
             <a:endParaRPr lang="de-DE" dirty="0"/>
           </a:p>
@@ -6322,7 +6322,7 @@
             <a:fld id="{B290341C-E875-4520-B517-C147063C318B}" type="datetime1">
               <a:rPr lang="de-DE" smtClean="0"/>
               <a:pPr/>
-              <a:t>18.05.2014</a:t>
+              <a:t>22.05.2014</a:t>
             </a:fld>
             <a:endParaRPr lang="de-DE" dirty="0"/>
           </a:p>
@@ -6641,7 +6641,7 @@
             <a:fld id="{B290341C-E875-4520-B517-C147063C318B}" type="datetime1">
               <a:rPr lang="de-DE" smtClean="0"/>
               <a:pPr/>
-              <a:t>18.05.2014</a:t>
+              <a:t>22.05.2014</a:t>
             </a:fld>
             <a:endParaRPr lang="de-DE" dirty="0"/>
           </a:p>
@@ -6997,7 +6997,7 @@
             <a:fld id="{B290341C-E875-4520-B517-C147063C318B}" type="datetime1">
               <a:rPr lang="de-DE" smtClean="0"/>
               <a:pPr/>
-              <a:t>18.05.2014</a:t>
+              <a:t>22.05.2014</a:t>
             </a:fld>
             <a:endParaRPr lang="de-DE" dirty="0"/>
           </a:p>
@@ -7308,7 +7308,7 @@
             <a:fld id="{B290341C-E875-4520-B517-C147063C318B}" type="datetime1">
               <a:rPr lang="de-DE" smtClean="0"/>
               <a:pPr/>
-              <a:t>18.05.2014</a:t>
+              <a:t>22.05.2014</a:t>
             </a:fld>
             <a:endParaRPr lang="de-DE" dirty="0"/>
           </a:p>
@@ -7684,7 +7684,7 @@
             <a:fld id="{B290341C-E875-4520-B517-C147063C318B}" type="datetime1">
               <a:rPr lang="de-DE" smtClean="0"/>
               <a:pPr/>
-              <a:t>18.05.2014</a:t>
+              <a:t>22.05.2014</a:t>
             </a:fld>
             <a:endParaRPr lang="de-DE" dirty="0"/>
           </a:p>
@@ -8064,7 +8064,7 @@
             <a:fld id="{B290341C-E875-4520-B517-C147063C318B}" type="datetime1">
               <a:rPr lang="de-DE" smtClean="0"/>
               <a:pPr/>
-              <a:t>18.05.2014</a:t>
+              <a:t>22.05.2014</a:t>
             </a:fld>
             <a:endParaRPr lang="de-DE" dirty="0"/>
           </a:p>
@@ -8426,7 +8426,7 @@
             <a:fld id="{EB7BCF64-8B73-4A04-A549-2E6D6EFA84A8}" type="datetime1">
               <a:rPr lang="de-DE" smtClean="0"/>
               <a:pPr/>
-              <a:t>18.05.2014</a:t>
+              <a:t>22.05.2014</a:t>
             </a:fld>
             <a:endParaRPr lang="de-DE" dirty="0"/>
           </a:p>
@@ -8664,7 +8664,7 @@
             <a:fld id="{B290341C-E875-4520-B517-C147063C318B}" type="datetime1">
               <a:rPr lang="de-DE" smtClean="0"/>
               <a:pPr/>
-              <a:t>18.05.2014</a:t>
+              <a:t>22.05.2014</a:t>
             </a:fld>
             <a:endParaRPr lang="de-DE" dirty="0"/>
           </a:p>
@@ -9058,7 +9058,7 @@
             <a:fld id="{B290341C-E875-4520-B517-C147063C318B}" type="datetime1">
               <a:rPr lang="de-DE" smtClean="0"/>
               <a:pPr/>
-              <a:t>18.05.2014</a:t>
+              <a:t>22.05.2014</a:t>
             </a:fld>
             <a:endParaRPr lang="de-DE" dirty="0"/>
           </a:p>
@@ -9231,7 +9231,7 @@
             <a:fld id="{B290341C-E875-4520-B517-C147063C318B}" type="datetime1">
               <a:rPr lang="de-DE" smtClean="0"/>
               <a:pPr/>
-              <a:t>18.05.2014</a:t>
+              <a:t>22.05.2014</a:t>
             </a:fld>
             <a:endParaRPr lang="de-DE" dirty="0"/>
           </a:p>
@@ -9773,7 +9773,7 @@
             <a:fld id="{8A6F6572-D852-47A0-9C06-26217B35BEBA}" type="datetime1">
               <a:rPr lang="de-DE" smtClean="0"/>
               <a:pPr/>
-              <a:t>18.05.2014</a:t>
+              <a:t>22.05.2014</a:t>
             </a:fld>
             <a:endParaRPr lang="de-DE" dirty="0"/>
           </a:p>
@@ -10093,7 +10093,7 @@
             <a:fld id="{B290341C-E875-4520-B517-C147063C318B}" type="datetime1">
               <a:rPr lang="de-DE" smtClean="0"/>
               <a:pPr/>
-              <a:t>18.05.2014</a:t>
+              <a:t>22.05.2014</a:t>
             </a:fld>
             <a:endParaRPr lang="de-DE" dirty="0"/>
           </a:p>
@@ -10305,7 +10305,7 @@
             <a:fld id="{6EA98DF9-3660-480E-9250-58B94F61E9F2}" type="datetime1">
               <a:rPr lang="de-DE" smtClean="0"/>
               <a:pPr/>
-              <a:t>18.05.2014</a:t>
+              <a:t>22.05.2014</a:t>
             </a:fld>
             <a:endParaRPr lang="de-DE" dirty="0"/>
           </a:p>
@@ -10667,7 +10667,7 @@
             <a:fld id="{6EA98DF9-3660-480E-9250-58B94F61E9F2}" type="datetime1">
               <a:rPr lang="de-DE" smtClean="0"/>
               <a:pPr/>
-              <a:t>18.05.2014</a:t>
+              <a:t>22.05.2014</a:t>
             </a:fld>
             <a:endParaRPr lang="de-DE" dirty="0"/>
           </a:p>
@@ -11064,7 +11064,7 @@
             <a:fld id="{6EA98DF9-3660-480E-9250-58B94F61E9F2}" type="datetime1">
               <a:rPr lang="de-DE" smtClean="0"/>
               <a:pPr/>
-              <a:t>18.05.2014</a:t>
+              <a:t>22.05.2014</a:t>
             </a:fld>
             <a:endParaRPr lang="de-DE" dirty="0"/>
           </a:p>
@@ -11683,7 +11683,7 @@
             <a:fld id="{6EA98DF9-3660-480E-9250-58B94F61E9F2}" type="datetime1">
               <a:rPr lang="de-DE" smtClean="0"/>
               <a:pPr/>
-              <a:t>18.05.2014</a:t>
+              <a:t>22.05.2014</a:t>
             </a:fld>
             <a:endParaRPr lang="de-DE" dirty="0"/>
           </a:p>
@@ -11871,7 +11871,7 @@
             <a:fld id="{B290341C-E875-4520-B517-C147063C318B}" type="datetime1">
               <a:rPr lang="de-DE" smtClean="0"/>
               <a:pPr/>
-              <a:t>18.05.2014</a:t>
+              <a:t>22.05.2014</a:t>
             </a:fld>
             <a:endParaRPr lang="de-DE" dirty="0"/>
           </a:p>
@@ -12077,7 +12077,7 @@
             <a:fld id="{BF91387C-FC77-42DD-B355-31BEEF2DA4A7}" type="datetime1">
               <a:rPr lang="de-DE" smtClean="0"/>
               <a:pPr/>
-              <a:t>18.05.2014</a:t>
+              <a:t>22.05.2014</a:t>
             </a:fld>
             <a:endParaRPr lang="de-DE" dirty="0"/>
           </a:p>
@@ -12289,7 +12289,7 @@
             <a:fld id="{084AFBB8-4158-47F1-AF32-0FE1CB4C2389}" type="datetime1">
               <a:rPr lang="de-DE" smtClean="0"/>
               <a:pPr/>
-              <a:t>18.05.2014</a:t>
+              <a:t>22.05.2014</a:t>
             </a:fld>
             <a:endParaRPr lang="de-DE" dirty="0"/>
           </a:p>
@@ -12470,7 +12470,7 @@
             <a:fld id="{084AFBB8-4158-47F1-AF32-0FE1CB4C2389}" type="datetime1">
               <a:rPr lang="de-DE" smtClean="0"/>
               <a:pPr/>
-              <a:t>18.05.2014</a:t>
+              <a:t>22.05.2014</a:t>
             </a:fld>
             <a:endParaRPr lang="de-DE" dirty="0"/>
           </a:p>
@@ -13004,7 +13004,7 @@
             <a:fld id="{084AFBB8-4158-47F1-AF32-0FE1CB4C2389}" type="datetime1">
               <a:rPr lang="de-DE" smtClean="0"/>
               <a:pPr/>
-              <a:t>18.05.2014</a:t>
+              <a:t>22.05.2014</a:t>
             </a:fld>
             <a:endParaRPr lang="de-DE" dirty="0"/>
           </a:p>
@@ -13713,7 +13713,7 @@
             <a:fld id="{D0A99D10-B9FA-4E6D-B0A1-671676D32A68}" type="datetime1">
               <a:rPr lang="de-DE" smtClean="0"/>
               <a:pPr/>
-              <a:t>18.05.2014</a:t>
+              <a:t>22.05.2014</a:t>
             </a:fld>
             <a:endParaRPr lang="de-DE" dirty="0"/>
           </a:p>
@@ -13894,7 +13894,7 @@
             <a:fld id="{084AFBB8-4158-47F1-AF32-0FE1CB4C2389}" type="datetime1">
               <a:rPr lang="de-DE" smtClean="0"/>
               <a:pPr/>
-              <a:t>18.05.2014</a:t>
+              <a:t>22.05.2014</a:t>
             </a:fld>
             <a:endParaRPr lang="de-DE" dirty="0"/>
           </a:p>
@@ -14333,7 +14333,7 @@
             <a:fld id="{084AFBB8-4158-47F1-AF32-0FE1CB4C2389}" type="datetime1">
               <a:rPr lang="de-DE" smtClean="0"/>
               <a:pPr/>
-              <a:t>18.05.2014</a:t>
+              <a:t>22.05.2014</a:t>
             </a:fld>
             <a:endParaRPr lang="de-DE" dirty="0"/>
           </a:p>
@@ -14862,7 +14862,7 @@
             <a:fld id="{7C22D35C-FB7C-4E8D-A531-1BDEEBD0C0EE}" type="datetime1">
               <a:rPr lang="de-DE" smtClean="0"/>
               <a:pPr/>
-              <a:t>18.05.2014</a:t>
+              <a:t>22.05.2014</a:t>
             </a:fld>
             <a:endParaRPr lang="de-DE" dirty="0"/>
           </a:p>
@@ -15063,7 +15063,7 @@
             <a:fld id="{FC430447-D9EB-489D-B384-86BFC124314C}" type="datetime1">
               <a:rPr lang="de-DE" smtClean="0"/>
               <a:pPr/>
-              <a:t>18.05.2014</a:t>
+              <a:t>22.05.2014</a:t>
             </a:fld>
             <a:endParaRPr lang="de-DE" dirty="0"/>
           </a:p>
@@ -15187,7 +15187,6 @@
               <a:rPr lang="de-DE" dirty="0" smtClean="0"/>
               <a:t>Meistens gute Beispiele</a:t>
             </a:r>
-            <a:endParaRPr lang="de-DE" dirty="0" smtClean="0"/>
           </a:p>
           <a:p>
             <a:r>
@@ -15262,17 +15261,7 @@
                 <a:latin typeface="Courier New" pitchFamily="49" charset="0"/>
                 <a:cs typeface="Courier New" pitchFamily="49" charset="0"/>
               </a:rPr>
-              <a:t>h</a:t>
-            </a:r>
-            <a:r>
-              <a:rPr lang="de-DE" sz="2000" dirty="0" err="1" smtClean="0">
-                <a:solidFill>
-                  <a:schemeClr val="tx1"/>
-                </a:solidFill>
-                <a:latin typeface="Courier New" pitchFamily="49" charset="0"/>
-                <a:cs typeface="Courier New" pitchFamily="49" charset="0"/>
-              </a:rPr>
-              <a:t>elp</a:t>
+              <a:t>help</a:t>
             </a:r>
             <a:r>
               <a:rPr lang="de-DE" sz="2000" dirty="0" smtClean="0">
@@ -15444,7 +15433,7 @@
             <a:fld id="{FC430447-D9EB-489D-B384-86BFC124314C}" type="datetime1">
               <a:rPr lang="de-DE" smtClean="0"/>
               <a:pPr/>
-              <a:t>18.05.2014</a:t>
+              <a:t>22.05.2014</a:t>
             </a:fld>
             <a:endParaRPr lang="de-DE" dirty="0"/>
           </a:p>
@@ -15546,7 +15535,6 @@
               <a:rPr lang="de-DE" dirty="0" smtClean="0"/>
               <a:t>Randbedingungen und Extremfälle</a:t>
             </a:r>
-            <a:endParaRPr lang="de-DE" dirty="0" smtClean="0"/>
           </a:p>
           <a:p>
             <a:pPr>
@@ -15657,7 +15645,7 @@
             <a:fld id="{B290341C-E875-4520-B517-C147063C318B}" type="datetime1">
               <a:rPr lang="de-DE" smtClean="0"/>
               <a:pPr/>
-              <a:t>18.05.2014</a:t>
+              <a:t>22.05.2014</a:t>
             </a:fld>
             <a:endParaRPr lang="de-DE" dirty="0"/>
           </a:p>
@@ -15770,11 +15758,7 @@
             </a:r>
             <a:r>
               <a:rPr lang="de-DE" dirty="0" smtClean="0"/>
-              <a:t>(</a:t>
-            </a:r>
-            <a:r>
-              <a:rPr lang="de-DE" dirty="0" smtClean="0"/>
-              <a:t>n-2) </a:t>
+              <a:t>(n-2) </a:t>
             </a:r>
             <a:r>
               <a:rPr lang="de-DE" dirty="0" smtClean="0">
@@ -15784,11 +15768,7 @@
             </a:r>
             <a:r>
               <a:rPr lang="de-DE" dirty="0" smtClean="0"/>
-              <a:t> </a:t>
-            </a:r>
-            <a:r>
-              <a:rPr lang="de-DE" dirty="0" smtClean="0"/>
-              <a:t>… </a:t>
+              <a:t> … </a:t>
             </a:r>
             <a:r>
               <a:rPr lang="de-DE" dirty="0" smtClean="0">
@@ -15798,17 +15778,8 @@
             </a:r>
             <a:r>
               <a:rPr lang="de-DE" dirty="0" smtClean="0"/>
-              <a:t> </a:t>
-            </a:r>
-            <a:r>
-              <a:rPr lang="de-DE" dirty="0" smtClean="0"/>
-              <a:t>(n-(</a:t>
-            </a:r>
-            <a:r>
-              <a:rPr lang="de-DE" dirty="0" smtClean="0"/>
-              <a:t>n-1))</a:t>
-            </a:r>
-            <a:endParaRPr lang="de-DE" dirty="0" smtClean="0"/>
+              <a:t> (n-(n-1))</a:t>
+            </a:r>
           </a:p>
           <a:p>
             <a:r>
@@ -15875,11 +15846,7 @@
           <a:p>
             <a:r>
               <a:rPr lang="de-DE" dirty="0" smtClean="0"/>
-              <a:t>Skript, welches die Fakultät einer Zahl </a:t>
-            </a:r>
-            <a:r>
-              <a:rPr lang="de-DE" dirty="0" smtClean="0"/>
-              <a:t>berechnet</a:t>
+              <a:t>Skript, welches die Fakultät einer Zahl berechnet</a:t>
             </a:r>
           </a:p>
           <a:p>
@@ -15900,7 +15867,6 @@
               <a:rPr lang="de-DE" i="1" dirty="0" smtClean="0"/>
               <a:t>&gt;</a:t>
             </a:r>
-            <a:endParaRPr lang="de-DE" i="1" dirty="0" smtClean="0"/>
           </a:p>
         </p:txBody>
       </p:sp>
@@ -16351,7 +16317,7 @@
             <a:fld id="{453C06CB-442D-4748-AE34-25E7F74B8047}" type="datetime1">
               <a:rPr lang="de-DE" smtClean="0"/>
               <a:pPr/>
-              <a:t>18.05.2014</a:t>
+              <a:t>22.05.2014</a:t>
             </a:fld>
             <a:endParaRPr lang="de-DE" dirty="0"/>
           </a:p>
@@ -16529,7 +16495,7 @@
             <a:fld id="{B290341C-E875-4520-B517-C147063C318B}" type="datetime1">
               <a:rPr lang="de-DE" smtClean="0"/>
               <a:pPr/>
-              <a:t>18.05.2014</a:t>
+              <a:t>22.05.2014</a:t>
             </a:fld>
             <a:endParaRPr lang="de-DE" dirty="0"/>
           </a:p>
@@ -16704,17 +16670,7 @@
                 <a:latin typeface="Courier New" pitchFamily="49" charset="0"/>
                 <a:cs typeface="Courier New" pitchFamily="49" charset="0"/>
               </a:rPr>
-              <a:t>i</a:t>
-            </a:r>
-            <a:r>
-              <a:rPr lang="de-DE" sz="2000" dirty="0" err="1" smtClean="0">
-                <a:solidFill>
-                  <a:schemeClr val="tx1"/>
-                </a:solidFill>
-                <a:latin typeface="Courier New" pitchFamily="49" charset="0"/>
-                <a:cs typeface="Courier New" pitchFamily="49" charset="0"/>
-              </a:rPr>
-              <a:t>f</a:t>
+              <a:t>if</a:t>
             </a:r>
             <a:r>
               <a:rPr lang="de-DE" sz="2000" dirty="0" smtClean="0">
@@ -16739,17 +16695,7 @@
                 <a:latin typeface="Courier New" pitchFamily="49" charset="0"/>
                 <a:cs typeface="Courier New" pitchFamily="49" charset="0"/>
               </a:rPr>
-              <a:t> </a:t>
-            </a:r>
-            <a:r>
-              <a:rPr lang="de-DE" sz="2000" dirty="0" smtClean="0">
-                <a:solidFill>
-                  <a:schemeClr val="tx1"/>
-                </a:solidFill>
-                <a:latin typeface="Courier New" pitchFamily="49" charset="0"/>
-                <a:cs typeface="Courier New" pitchFamily="49" charset="0"/>
-              </a:rPr>
-              <a:t> </a:t>
+              <a:t>  </a:t>
             </a:r>
             <a:r>
               <a:rPr lang="de-DE" sz="2000" dirty="0" err="1" smtClean="0">
@@ -16806,9 +16752,74 @@
                 <a:latin typeface="Courier New" pitchFamily="49" charset="0"/>
                 <a:cs typeface="Courier New" pitchFamily="49" charset="0"/>
               </a:rPr>
+              <a:t>  </a:t>
+            </a:r>
+            <a:r>
+              <a:rPr lang="de-DE" sz="2000" dirty="0" err="1" smtClean="0">
+                <a:solidFill>
+                  <a:schemeClr val="tx1"/>
+                </a:solidFill>
+                <a:latin typeface="Courier New" pitchFamily="49" charset="0"/>
+                <a:cs typeface="Courier New" pitchFamily="49" charset="0"/>
+              </a:rPr>
+              <a:t>ergebnis</a:t>
+            </a:r>
+            <a:r>
+              <a:rPr lang="de-DE" sz="2000" dirty="0" smtClean="0">
+                <a:solidFill>
+                  <a:schemeClr val="tx1"/>
+                </a:solidFill>
+                <a:latin typeface="Courier New" pitchFamily="49" charset="0"/>
+                <a:cs typeface="Courier New" pitchFamily="49" charset="0"/>
+              </a:rPr>
+              <a:t> = 1;</a:t>
+            </a:r>
+          </a:p>
+          <a:p>
+            <a:pPr>
+              <a:buNone/>
+            </a:pPr>
+            <a:r>
+              <a:rPr lang="de-DE" sz="2000" dirty="0" smtClean="0">
+                <a:solidFill>
+                  <a:schemeClr val="tx1"/>
+                </a:solidFill>
+                <a:latin typeface="Courier New" pitchFamily="49" charset="0"/>
+                <a:cs typeface="Courier New" pitchFamily="49" charset="0"/>
+              </a:rPr>
+              <a:t>  </a:t>
+            </a:r>
+            <a:r>
+              <a:rPr lang="de-DE" sz="2000" dirty="0" err="1" smtClean="0">
+                <a:solidFill>
+                  <a:schemeClr val="tx1"/>
+                </a:solidFill>
+                <a:latin typeface="Courier New" pitchFamily="49" charset="0"/>
+                <a:cs typeface="Courier New" pitchFamily="49" charset="0"/>
+              </a:rPr>
+              <a:t>for</a:t>
+            </a:r>
+            <a:r>
+              <a:rPr lang="de-DE" sz="2000" dirty="0" smtClean="0">
+                <a:solidFill>
+                  <a:schemeClr val="tx1"/>
+                </a:solidFill>
+                <a:latin typeface="Courier New" pitchFamily="49" charset="0"/>
+                <a:cs typeface="Courier New" pitchFamily="49" charset="0"/>
+              </a:rPr>
               <a:t> </a:t>
             </a:r>
             <a:r>
+              <a:rPr lang="de-DE" sz="2000" dirty="0" err="1" smtClean="0">
+                <a:solidFill>
+                  <a:schemeClr val="tx1"/>
+                </a:solidFill>
+                <a:latin typeface="Courier New" pitchFamily="49" charset="0"/>
+                <a:cs typeface="Courier New" pitchFamily="49" charset="0"/>
+              </a:rPr>
+              <a:t>zaehler</a:t>
+            </a:r>
+            <a:r>
               <a:rPr lang="de-DE" sz="2000" dirty="0" smtClean="0">
                 <a:solidFill>
                   <a:schemeClr val="tx1"/>
@@ -16816,7 +16827,22 @@
                 <a:latin typeface="Courier New" pitchFamily="49" charset="0"/>
                 <a:cs typeface="Courier New" pitchFamily="49" charset="0"/>
               </a:rPr>
-              <a:t> </a:t>
+              <a:t> = n : -1 : 1</a:t>
+            </a:r>
+          </a:p>
+          <a:p>
+            <a:pPr>
+              <a:buNone/>
+            </a:pPr>
+            <a:r>
+              <a:rPr lang="de-DE" sz="2000" dirty="0" smtClean="0">
+                <a:solidFill>
+                  <a:schemeClr val="tx1"/>
+                </a:solidFill>
+                <a:latin typeface="Courier New" pitchFamily="49" charset="0"/>
+                <a:cs typeface="Courier New" pitchFamily="49" charset="0"/>
+              </a:rPr>
+              <a:t>    </a:t>
             </a:r>
             <a:r>
               <a:rPr lang="de-DE" sz="2000" dirty="0" err="1" smtClean="0">
@@ -16836,13 +16862,18 @@
                 <a:latin typeface="Courier New" pitchFamily="49" charset="0"/>
                 <a:cs typeface="Courier New" pitchFamily="49" charset="0"/>
               </a:rPr>
-              <a:t> = 1;</a:t>
-            </a:r>
-          </a:p>
-          <a:p>
-            <a:pPr>
-              <a:buNone/>
-            </a:pPr>
+              <a:t> = </a:t>
+            </a:r>
+            <a:r>
+              <a:rPr lang="de-DE" sz="2000" dirty="0" err="1" smtClean="0">
+                <a:solidFill>
+                  <a:schemeClr val="tx1"/>
+                </a:solidFill>
+                <a:latin typeface="Courier New" pitchFamily="49" charset="0"/>
+                <a:cs typeface="Courier New" pitchFamily="49" charset="0"/>
+              </a:rPr>
+              <a:t>ergebnis</a:t>
+            </a:r>
             <a:r>
               <a:rPr lang="de-DE" sz="2000" dirty="0" smtClean="0">
                 <a:solidFill>
@@ -16851,7 +16882,7 @@
                 <a:latin typeface="Courier New" pitchFamily="49" charset="0"/>
                 <a:cs typeface="Courier New" pitchFamily="49" charset="0"/>
               </a:rPr>
-              <a:t>  </a:t>
+              <a:t> * </a:t>
             </a:r>
             <a:r>
               <a:rPr lang="de-DE" sz="2000" dirty="0" err="1" smtClean="0">
@@ -16861,7 +16892,7 @@
                 <a:latin typeface="Courier New" pitchFamily="49" charset="0"/>
                 <a:cs typeface="Courier New" pitchFamily="49" charset="0"/>
               </a:rPr>
-              <a:t>for</a:t>
+              <a:t>zaehler</a:t>
             </a:r>
             <a:r>
               <a:rPr lang="de-DE" sz="2000" dirty="0" smtClean="0">
@@ -16871,18 +16902,13 @@
                 <a:latin typeface="Courier New" pitchFamily="49" charset="0"/>
                 <a:cs typeface="Courier New" pitchFamily="49" charset="0"/>
               </a:rPr>
-              <a:t> </a:t>
-            </a:r>
-            <a:r>
-              <a:rPr lang="de-DE" sz="2000" dirty="0" err="1" smtClean="0">
-                <a:solidFill>
-                  <a:schemeClr val="tx1"/>
-                </a:solidFill>
-                <a:latin typeface="Courier New" pitchFamily="49" charset="0"/>
-                <a:cs typeface="Courier New" pitchFamily="49" charset="0"/>
-              </a:rPr>
-              <a:t>zaehler</a:t>
-            </a:r>
+              <a:t>;</a:t>
+            </a:r>
+          </a:p>
+          <a:p>
+            <a:pPr>
+              <a:buNone/>
+            </a:pPr>
             <a:r>
               <a:rPr lang="de-DE" sz="2000" dirty="0" smtClean="0">
                 <a:solidFill>
@@ -16891,117 +16917,7 @@
                 <a:latin typeface="Courier New" pitchFamily="49" charset="0"/>
                 <a:cs typeface="Courier New" pitchFamily="49" charset="0"/>
               </a:rPr>
-              <a:t> = n : -1 : 1</a:t>
-            </a:r>
-          </a:p>
-          <a:p>
-            <a:pPr>
-              <a:buNone/>
-            </a:pPr>
-            <a:r>
-              <a:rPr lang="de-DE" sz="2000" dirty="0" smtClean="0">
-                <a:solidFill>
-                  <a:schemeClr val="tx1"/>
-                </a:solidFill>
-                <a:latin typeface="Courier New" pitchFamily="49" charset="0"/>
-                <a:cs typeface="Courier New" pitchFamily="49" charset="0"/>
-              </a:rPr>
-              <a:t> </a:t>
-            </a:r>
-            <a:r>
-              <a:rPr lang="de-DE" sz="2000" dirty="0" smtClean="0">
-                <a:solidFill>
-                  <a:schemeClr val="tx1"/>
-                </a:solidFill>
-                <a:latin typeface="Courier New" pitchFamily="49" charset="0"/>
-                <a:cs typeface="Courier New" pitchFamily="49" charset="0"/>
-              </a:rPr>
-              <a:t>   </a:t>
-            </a:r>
-            <a:r>
-              <a:rPr lang="de-DE" sz="2000" dirty="0" err="1" smtClean="0">
-                <a:solidFill>
-                  <a:schemeClr val="tx1"/>
-                </a:solidFill>
-                <a:latin typeface="Courier New" pitchFamily="49" charset="0"/>
-                <a:cs typeface="Courier New" pitchFamily="49" charset="0"/>
-              </a:rPr>
-              <a:t>ergebnis</a:t>
-            </a:r>
-            <a:r>
-              <a:rPr lang="de-DE" sz="2000" dirty="0" smtClean="0">
-                <a:solidFill>
-                  <a:schemeClr val="tx1"/>
-                </a:solidFill>
-                <a:latin typeface="Courier New" pitchFamily="49" charset="0"/>
-                <a:cs typeface="Courier New" pitchFamily="49" charset="0"/>
-              </a:rPr>
-              <a:t> = </a:t>
-            </a:r>
-            <a:r>
-              <a:rPr lang="de-DE" sz="2000" dirty="0" err="1" smtClean="0">
-                <a:solidFill>
-                  <a:schemeClr val="tx1"/>
-                </a:solidFill>
-                <a:latin typeface="Courier New" pitchFamily="49" charset="0"/>
-                <a:cs typeface="Courier New" pitchFamily="49" charset="0"/>
-              </a:rPr>
-              <a:t>ergebnis</a:t>
-            </a:r>
-            <a:r>
-              <a:rPr lang="de-DE" sz="2000" dirty="0" smtClean="0">
-                <a:solidFill>
-                  <a:schemeClr val="tx1"/>
-                </a:solidFill>
-                <a:latin typeface="Courier New" pitchFamily="49" charset="0"/>
-                <a:cs typeface="Courier New" pitchFamily="49" charset="0"/>
-              </a:rPr>
-              <a:t> * </a:t>
-            </a:r>
-            <a:r>
-              <a:rPr lang="de-DE" sz="2000" dirty="0" err="1" smtClean="0">
-                <a:solidFill>
-                  <a:schemeClr val="tx1"/>
-                </a:solidFill>
-                <a:latin typeface="Courier New" pitchFamily="49" charset="0"/>
-                <a:cs typeface="Courier New" pitchFamily="49" charset="0"/>
-              </a:rPr>
-              <a:t>zaehler</a:t>
-            </a:r>
-            <a:r>
-              <a:rPr lang="de-DE" sz="2000" dirty="0" smtClean="0">
-                <a:solidFill>
-                  <a:schemeClr val="tx1"/>
-                </a:solidFill>
-                <a:latin typeface="Courier New" pitchFamily="49" charset="0"/>
-                <a:cs typeface="Courier New" pitchFamily="49" charset="0"/>
-              </a:rPr>
-              <a:t>;</a:t>
-            </a:r>
-          </a:p>
-          <a:p>
-            <a:pPr>
-              <a:buNone/>
-            </a:pPr>
-            <a:r>
-              <a:rPr lang="de-DE" sz="2000" dirty="0" smtClean="0">
-                <a:solidFill>
-                  <a:schemeClr val="tx1"/>
-                </a:solidFill>
-                <a:latin typeface="Courier New" pitchFamily="49" charset="0"/>
-                <a:cs typeface="Courier New" pitchFamily="49" charset="0"/>
-              </a:rPr>
-              <a:t> </a:t>
-            </a:r>
-            <a:r>
-              <a:rPr lang="de-DE" sz="2000" dirty="0" smtClean="0">
-                <a:solidFill>
-                  <a:schemeClr val="tx1"/>
-                </a:solidFill>
-                <a:latin typeface="Courier New" pitchFamily="49" charset="0"/>
-                <a:cs typeface="Courier New" pitchFamily="49" charset="0"/>
-              </a:rPr>
-              <a:t> end</a:t>
+              <a:t>  end</a:t>
             </a:r>
           </a:p>
           <a:p>
@@ -17153,17 +17069,7 @@
                 <a:latin typeface="Courier New" pitchFamily="49" charset="0"/>
                 <a:cs typeface="Courier New" pitchFamily="49" charset="0"/>
               </a:rPr>
-              <a:t> </a:t>
-            </a:r>
-            <a:r>
-              <a:rPr lang="de-DE" sz="2000" dirty="0" smtClean="0">
-                <a:solidFill>
-                  <a:schemeClr val="tx1"/>
-                </a:solidFill>
-                <a:latin typeface="Courier New" pitchFamily="49" charset="0"/>
-                <a:cs typeface="Courier New" pitchFamily="49" charset="0"/>
-              </a:rPr>
-              <a:t> </a:t>
+              <a:t>  </a:t>
             </a:r>
             <a:r>
               <a:rPr lang="de-DE" sz="2000" dirty="0" err="1" smtClean="0">
@@ -17786,7 +17692,7 @@
             <a:fld id="{B290341C-E875-4520-B517-C147063C318B}" type="datetime1">
               <a:rPr lang="de-DE" smtClean="0"/>
               <a:pPr/>
-              <a:t>18.05.2014</a:t>
+              <a:t>22.05.2014</a:t>
             </a:fld>
             <a:endParaRPr lang="de-DE" dirty="0"/>
           </a:p>
@@ -17872,11 +17778,7 @@
           <a:p>
             <a:r>
               <a:rPr lang="de-DE" dirty="0" smtClean="0"/>
-              <a:t>Was </a:t>
-            </a:r>
-            <a:r>
-              <a:rPr lang="de-DE" dirty="0" smtClean="0"/>
-              <a:t>ist die </a:t>
+              <a:t>Was ist die </a:t>
             </a:r>
             <a:r>
               <a:rPr lang="de-DE" dirty="0" err="1" smtClean="0"/>
@@ -17884,13 +17786,8 @@
             </a:r>
             <a:r>
               <a:rPr lang="de-DE" dirty="0" smtClean="0"/>
-              <a:t>-Folge</a:t>
-            </a:r>
-            <a:r>
-              <a:rPr lang="de-DE" dirty="0" smtClean="0"/>
-              <a:t>?</a:t>
-            </a:r>
-            <a:endParaRPr lang="de-DE" dirty="0" smtClean="0"/>
+              <a:t>-Folge?</a:t>
+            </a:r>
           </a:p>
           <a:p>
             <a:pPr lvl="1"/>
@@ -17905,16 +17802,11 @@
               <a:rPr lang="de-DE" dirty="0" smtClean="0"/>
               <a:t>f(n) = f(n-2) + f(n-1)</a:t>
             </a:r>
-            <a:endParaRPr lang="de-DE" dirty="0" smtClean="0"/>
-          </a:p>
-          <a:p>
-            <a:r>
-              <a:rPr lang="de-DE" dirty="0" smtClean="0"/>
-              <a:t>Auf </a:t>
-            </a:r>
-            <a:r>
-              <a:rPr lang="de-DE" dirty="0" smtClean="0"/>
-              <a:t>welchem Bereich ist sie definiert?</a:t>
+          </a:p>
+          <a:p>
+            <a:r>
+              <a:rPr lang="de-DE" dirty="0" smtClean="0"/>
+              <a:t>Auf welchem Bereich ist sie definiert?</a:t>
             </a:r>
           </a:p>
           <a:p>
@@ -17958,13 +17850,8 @@
             <a:pPr lvl="1"/>
             <a:r>
               <a:rPr lang="de-DE" dirty="0" smtClean="0"/>
-              <a:t>f</a:t>
-            </a:r>
-            <a:r>
-              <a:rPr lang="de-DE" dirty="0" smtClean="0"/>
-              <a:t>(0) = 0 und f(1) = 1</a:t>
-            </a:r>
-            <a:endParaRPr lang="de-DE" dirty="0" smtClean="0"/>
+              <a:t>f(0) = 0 und f(1) = 1</a:t>
+            </a:r>
           </a:p>
           <a:p>
             <a:pPr>
@@ -17978,11 +17865,7 @@
           <a:p>
             <a:r>
               <a:rPr lang="de-DE" dirty="0" smtClean="0"/>
-              <a:t>Skript, welches </a:t>
-            </a:r>
-            <a:r>
-              <a:rPr lang="de-DE" dirty="0" smtClean="0"/>
-              <a:t>die </a:t>
+              <a:t>Skript, welches die </a:t>
             </a:r>
             <a:r>
               <a:rPr lang="de-DE" dirty="0" err="1" smtClean="0"/>
@@ -18476,7 +18359,7 @@
             <a:fld id="{B290341C-E875-4520-B517-C147063C318B}" type="datetime1">
               <a:rPr lang="de-DE" smtClean="0"/>
               <a:pPr/>
-              <a:t>18.05.2014</a:t>
+              <a:t>22.05.2014</a:t>
             </a:fld>
             <a:endParaRPr lang="de-DE" dirty="0"/>
           </a:p>
@@ -18609,7 +18492,32 @@
                 <a:latin typeface="Courier New" pitchFamily="49" charset="0"/>
                 <a:cs typeface="Courier New" pitchFamily="49" charset="0"/>
               </a:rPr>
-              <a:t>i</a:t>
+              <a:t>if</a:t>
+            </a:r>
+            <a:r>
+              <a:rPr lang="de-DE" sz="1900" dirty="0" smtClean="0">
+                <a:solidFill>
+                  <a:schemeClr val="tx1"/>
+                </a:solidFill>
+                <a:latin typeface="Courier New" pitchFamily="49" charset="0"/>
+                <a:cs typeface="Courier New" pitchFamily="49" charset="0"/>
+              </a:rPr>
+              <a:t> 0 == n</a:t>
+            </a:r>
+          </a:p>
+          <a:p>
+            <a:pPr>
+              <a:buNone/>
+            </a:pPr>
+            <a:r>
+              <a:rPr lang="de-DE" sz="1900" dirty="0" smtClean="0">
+                <a:solidFill>
+                  <a:schemeClr val="tx1"/>
+                </a:solidFill>
+                <a:latin typeface="Courier New" pitchFamily="49" charset="0"/>
+                <a:cs typeface="Courier New" pitchFamily="49" charset="0"/>
+              </a:rPr>
+              <a:t>  </a:t>
             </a:r>
             <a:r>
               <a:rPr lang="de-DE" sz="1900" dirty="0" err="1" smtClean="0">
@@ -18619,7 +18527,7 @@
                 <a:latin typeface="Courier New" pitchFamily="49" charset="0"/>
                 <a:cs typeface="Courier New" pitchFamily="49" charset="0"/>
               </a:rPr>
-              <a:t>f</a:t>
+              <a:t>disp</a:t>
             </a:r>
             <a:r>
               <a:rPr lang="de-DE" sz="1900" dirty="0" smtClean="0">
@@ -18629,13 +18537,23 @@
                 <a:latin typeface="Courier New" pitchFamily="49" charset="0"/>
                 <a:cs typeface="Courier New" pitchFamily="49" charset="0"/>
               </a:rPr>
-              <a:t> 0 == n</a:t>
-            </a:r>
-          </a:p>
-          <a:p>
-            <a:pPr>
-              <a:buNone/>
-            </a:pPr>
+              <a:t>(0);</a:t>
+            </a:r>
+          </a:p>
+          <a:p>
+            <a:pPr>
+              <a:buNone/>
+            </a:pPr>
+            <a:r>
+              <a:rPr lang="de-DE" sz="1900" dirty="0" err="1" smtClean="0">
+                <a:solidFill>
+                  <a:schemeClr val="tx1"/>
+                </a:solidFill>
+                <a:latin typeface="Courier New" pitchFamily="49" charset="0"/>
+                <a:cs typeface="Courier New" pitchFamily="49" charset="0"/>
+              </a:rPr>
+              <a:t>elseif</a:t>
+            </a:r>
             <a:r>
               <a:rPr lang="de-DE" sz="1900" dirty="0" smtClean="0">
                 <a:solidFill>
@@ -18644,8 +18562,13 @@
                 <a:latin typeface="Courier New" pitchFamily="49" charset="0"/>
                 <a:cs typeface="Courier New" pitchFamily="49" charset="0"/>
               </a:rPr>
-              <a:t> </a:t>
-            </a:r>
+              <a:t> 1 == n </a:t>
+            </a:r>
+          </a:p>
+          <a:p>
+            <a:pPr>
+              <a:buNone/>
+            </a:pPr>
             <a:r>
               <a:rPr lang="de-DE" sz="1900" dirty="0" smtClean="0">
                 <a:solidFill>
@@ -18654,7 +18577,7 @@
                 <a:latin typeface="Courier New" pitchFamily="49" charset="0"/>
                 <a:cs typeface="Courier New" pitchFamily="49" charset="0"/>
               </a:rPr>
-              <a:t> </a:t>
+              <a:t>  </a:t>
             </a:r>
             <a:r>
               <a:rPr lang="de-DE" sz="1900" dirty="0" err="1" smtClean="0">
@@ -18682,16 +18605,6 @@
               <a:buNone/>
             </a:pPr>
             <a:r>
-              <a:rPr lang="de-DE" sz="1900" dirty="0" err="1" smtClean="0">
-                <a:solidFill>
-                  <a:schemeClr val="tx1"/>
-                </a:solidFill>
-                <a:latin typeface="Courier New" pitchFamily="49" charset="0"/>
-                <a:cs typeface="Courier New" pitchFamily="49" charset="0"/>
-              </a:rPr>
-              <a:t>elseif</a:t>
-            </a:r>
-            <a:r>
               <a:rPr lang="de-DE" sz="1900" dirty="0" smtClean="0">
                 <a:solidFill>
                   <a:schemeClr val="tx1"/>
@@ -18699,77 +18612,7 @@
                 <a:latin typeface="Courier New" pitchFamily="49" charset="0"/>
                 <a:cs typeface="Courier New" pitchFamily="49" charset="0"/>
               </a:rPr>
-              <a:t> 1 == n </a:t>
-            </a:r>
-          </a:p>
-          <a:p>
-            <a:pPr>
-              <a:buNone/>
-            </a:pPr>
-            <a:r>
-              <a:rPr lang="de-DE" sz="1900" dirty="0" smtClean="0">
-                <a:solidFill>
-                  <a:schemeClr val="tx1"/>
-                </a:solidFill>
-                <a:latin typeface="Courier New" pitchFamily="49" charset="0"/>
-                <a:cs typeface="Courier New" pitchFamily="49" charset="0"/>
-              </a:rPr>
-              <a:t> </a:t>
-            </a:r>
-            <a:r>
-              <a:rPr lang="de-DE" sz="1900" dirty="0" smtClean="0">
-                <a:solidFill>
-                  <a:schemeClr val="tx1"/>
-                </a:solidFill>
-                <a:latin typeface="Courier New" pitchFamily="49" charset="0"/>
-                <a:cs typeface="Courier New" pitchFamily="49" charset="0"/>
-              </a:rPr>
-              <a:t> </a:t>
-            </a:r>
-            <a:r>
-              <a:rPr lang="de-DE" sz="1900" dirty="0" err="1" smtClean="0">
-                <a:solidFill>
-                  <a:schemeClr val="tx1"/>
-                </a:solidFill>
-                <a:latin typeface="Courier New" pitchFamily="49" charset="0"/>
-                <a:cs typeface="Courier New" pitchFamily="49" charset="0"/>
-              </a:rPr>
-              <a:t>disp</a:t>
-            </a:r>
-            <a:r>
-              <a:rPr lang="de-DE" sz="1900" dirty="0" smtClean="0">
-                <a:solidFill>
-                  <a:schemeClr val="tx1"/>
-                </a:solidFill>
-                <a:latin typeface="Courier New" pitchFamily="49" charset="0"/>
-                <a:cs typeface="Courier New" pitchFamily="49" charset="0"/>
-              </a:rPr>
-              <a:t>(0);</a:t>
-            </a:r>
-          </a:p>
-          <a:p>
-            <a:pPr>
-              <a:buNone/>
-            </a:pPr>
-            <a:r>
-              <a:rPr lang="de-DE" sz="1900" dirty="0" smtClean="0">
-                <a:solidFill>
-                  <a:schemeClr val="tx1"/>
-                </a:solidFill>
-                <a:latin typeface="Courier New" pitchFamily="49" charset="0"/>
-                <a:cs typeface="Courier New" pitchFamily="49" charset="0"/>
-              </a:rPr>
-              <a:t> </a:t>
-            </a:r>
-            <a:r>
-              <a:rPr lang="de-DE" sz="1900" dirty="0" smtClean="0">
-                <a:solidFill>
-                  <a:schemeClr val="tx1"/>
-                </a:solidFill>
-                <a:latin typeface="Courier New" pitchFamily="49" charset="0"/>
-                <a:cs typeface="Courier New" pitchFamily="49" charset="0"/>
-              </a:rPr>
-              <a:t> </a:t>
+              <a:t>  </a:t>
             </a:r>
             <a:r>
               <a:rPr lang="de-DE" sz="1900" dirty="0" err="1" smtClean="0">
@@ -18861,9 +18704,104 @@
                 <a:latin typeface="Courier New" pitchFamily="49" charset="0"/>
                 <a:cs typeface="Courier New" pitchFamily="49" charset="0"/>
               </a:rPr>
+              <a:t>  </a:t>
+            </a:r>
+            <a:r>
+              <a:rPr lang="de-DE" sz="1900" dirty="0" err="1" smtClean="0">
+                <a:solidFill>
+                  <a:schemeClr val="tx1"/>
+                </a:solidFill>
+                <a:latin typeface="Courier New" pitchFamily="49" charset="0"/>
+                <a:cs typeface="Courier New" pitchFamily="49" charset="0"/>
+              </a:rPr>
+              <a:t>disp</a:t>
+            </a:r>
+            <a:r>
+              <a:rPr lang="de-DE" sz="1900" dirty="0" smtClean="0">
+                <a:solidFill>
+                  <a:schemeClr val="tx1"/>
+                </a:solidFill>
+                <a:latin typeface="Courier New" pitchFamily="49" charset="0"/>
+                <a:cs typeface="Courier New" pitchFamily="49" charset="0"/>
+              </a:rPr>
+              <a:t>(1);</a:t>
+            </a:r>
+          </a:p>
+          <a:p>
+            <a:pPr>
+              <a:buNone/>
+            </a:pPr>
+            <a:r>
+              <a:rPr lang="de-DE" sz="1900" dirty="0" smtClean="0">
+                <a:solidFill>
+                  <a:schemeClr val="tx1"/>
+                </a:solidFill>
+                <a:latin typeface="Courier New" pitchFamily="49" charset="0"/>
+                <a:cs typeface="Courier New" pitchFamily="49" charset="0"/>
+              </a:rPr>
+              <a:t>  fn_2 = 0;  %Wert für f(n-2)</a:t>
+            </a:r>
+          </a:p>
+          <a:p>
+            <a:pPr>
+              <a:buNone/>
+            </a:pPr>
+            <a:r>
+              <a:rPr lang="de-DE" sz="1900" dirty="0" smtClean="0">
+                <a:solidFill>
+                  <a:schemeClr val="tx1"/>
+                </a:solidFill>
+                <a:latin typeface="Courier New" pitchFamily="49" charset="0"/>
+                <a:cs typeface="Courier New" pitchFamily="49" charset="0"/>
+              </a:rPr>
+              <a:t>  fn_1 = 1;  %Wert für f(n-1)</a:t>
+            </a:r>
+          </a:p>
+          <a:p>
+            <a:pPr>
+              <a:buNone/>
+            </a:pPr>
+            <a:r>
+              <a:rPr lang="de-DE" sz="1900" dirty="0" smtClean="0">
+                <a:solidFill>
+                  <a:schemeClr val="tx1"/>
+                </a:solidFill>
+                <a:latin typeface="Courier New" pitchFamily="49" charset="0"/>
+                <a:cs typeface="Courier New" pitchFamily="49" charset="0"/>
+              </a:rPr>
+              <a:t>  </a:t>
+            </a:r>
+            <a:r>
+              <a:rPr lang="de-DE" sz="1900" dirty="0" err="1" smtClean="0">
+                <a:solidFill>
+                  <a:schemeClr val="tx1"/>
+                </a:solidFill>
+                <a:latin typeface="Courier New" pitchFamily="49" charset="0"/>
+                <a:cs typeface="Courier New" pitchFamily="49" charset="0"/>
+              </a:rPr>
+              <a:t>for</a:t>
+            </a:r>
+            <a:r>
+              <a:rPr lang="de-DE" sz="1900" dirty="0" smtClean="0">
+                <a:solidFill>
+                  <a:schemeClr val="tx1"/>
+                </a:solidFill>
+                <a:latin typeface="Courier New" pitchFamily="49" charset="0"/>
+                <a:cs typeface="Courier New" pitchFamily="49" charset="0"/>
+              </a:rPr>
               <a:t> </a:t>
             </a:r>
             <a:r>
+              <a:rPr lang="de-DE" sz="1900" dirty="0" err="1" smtClean="0">
+                <a:solidFill>
+                  <a:schemeClr val="tx1"/>
+                </a:solidFill>
+                <a:latin typeface="Courier New" pitchFamily="49" charset="0"/>
+                <a:cs typeface="Courier New" pitchFamily="49" charset="0"/>
+              </a:rPr>
+              <a:t>zaehler</a:t>
+            </a:r>
+            <a:r>
               <a:rPr lang="de-DE" sz="1900" dirty="0" smtClean="0">
                 <a:solidFill>
                   <a:schemeClr val="tx1"/>
@@ -18871,7 +18809,22 @@
                 <a:latin typeface="Courier New" pitchFamily="49" charset="0"/>
                 <a:cs typeface="Courier New" pitchFamily="49" charset="0"/>
               </a:rPr>
-              <a:t> </a:t>
+              <a:t> = 2 : +1 : n</a:t>
+            </a:r>
+          </a:p>
+          <a:p>
+            <a:pPr>
+              <a:buNone/>
+            </a:pPr>
+            <a:r>
+              <a:rPr lang="de-DE" sz="1900" dirty="0" smtClean="0">
+                <a:solidFill>
+                  <a:schemeClr val="tx1"/>
+                </a:solidFill>
+                <a:latin typeface="Courier New" pitchFamily="49" charset="0"/>
+                <a:cs typeface="Courier New" pitchFamily="49" charset="0"/>
+              </a:rPr>
+              <a:t>    </a:t>
             </a:r>
             <a:r>
               <a:rPr lang="de-DE" sz="1900" dirty="0" err="1" smtClean="0">
@@ -18881,6 +18834,41 @@
                 <a:latin typeface="Courier New" pitchFamily="49" charset="0"/>
                 <a:cs typeface="Courier New" pitchFamily="49" charset="0"/>
               </a:rPr>
+              <a:t>fn</a:t>
+            </a:r>
+            <a:r>
+              <a:rPr lang="de-DE" sz="1900" dirty="0" smtClean="0">
+                <a:solidFill>
+                  <a:schemeClr val="tx1"/>
+                </a:solidFill>
+                <a:latin typeface="Courier New" pitchFamily="49" charset="0"/>
+                <a:cs typeface="Courier New" pitchFamily="49" charset="0"/>
+              </a:rPr>
+              <a:t> = fn_2 + fn_1;</a:t>
+            </a:r>
+          </a:p>
+          <a:p>
+            <a:pPr>
+              <a:buNone/>
+            </a:pPr>
+            <a:r>
+              <a:rPr lang="de-DE" sz="1900" dirty="0" smtClean="0">
+                <a:solidFill>
+                  <a:schemeClr val="tx1"/>
+                </a:solidFill>
+                <a:latin typeface="Courier New" pitchFamily="49" charset="0"/>
+                <a:cs typeface="Courier New" pitchFamily="49" charset="0"/>
+              </a:rPr>
+              <a:t>    </a:t>
+            </a:r>
+            <a:r>
+              <a:rPr lang="de-DE" sz="1900" dirty="0" err="1" smtClean="0">
+                <a:solidFill>
+                  <a:schemeClr val="tx1"/>
+                </a:solidFill>
+                <a:latin typeface="Courier New" pitchFamily="49" charset="0"/>
+                <a:cs typeface="Courier New" pitchFamily="49" charset="0"/>
+              </a:rPr>
               <a:t>disp</a:t>
             </a:r>
             <a:r>
@@ -18891,13 +18879,18 @@
                 <a:latin typeface="Courier New" pitchFamily="49" charset="0"/>
                 <a:cs typeface="Courier New" pitchFamily="49" charset="0"/>
               </a:rPr>
-              <a:t>(1);</a:t>
-            </a:r>
-          </a:p>
-          <a:p>
-            <a:pPr>
-              <a:buNone/>
-            </a:pPr>
+              <a:t>(</a:t>
+            </a:r>
+            <a:r>
+              <a:rPr lang="de-DE" sz="1900" dirty="0" err="1" smtClean="0">
+                <a:solidFill>
+                  <a:schemeClr val="tx1"/>
+                </a:solidFill>
+                <a:latin typeface="Courier New" pitchFamily="49" charset="0"/>
+                <a:cs typeface="Courier New" pitchFamily="49" charset="0"/>
+              </a:rPr>
+              <a:t>fn</a:t>
+            </a:r>
             <a:r>
               <a:rPr lang="de-DE" sz="1900" dirty="0" smtClean="0">
                 <a:solidFill>
@@ -18906,8 +18899,13 @@
                 <a:latin typeface="Courier New" pitchFamily="49" charset="0"/>
                 <a:cs typeface="Courier New" pitchFamily="49" charset="0"/>
               </a:rPr>
-              <a:t> </a:t>
-            </a:r>
+              <a:t>);</a:t>
+            </a:r>
+          </a:p>
+          <a:p>
+            <a:pPr>
+              <a:buNone/>
+            </a:pPr>
             <a:r>
               <a:rPr lang="de-DE" sz="1900" dirty="0" smtClean="0">
                 <a:solidFill>
@@ -18916,7 +18914,7 @@
                 <a:latin typeface="Courier New" pitchFamily="49" charset="0"/>
                 <a:cs typeface="Courier New" pitchFamily="49" charset="0"/>
               </a:rPr>
-              <a:t> fn_2 = 0;  %Wert für f(n-2)</a:t>
+              <a:t>    fn_2 = fn_1;</a:t>
             </a:r>
           </a:p>
           <a:p>
@@ -18931,7 +18929,17 @@
                 <a:latin typeface="Courier New" pitchFamily="49" charset="0"/>
                 <a:cs typeface="Courier New" pitchFamily="49" charset="0"/>
               </a:rPr>
-              <a:t> </a:t>
+              <a:t>    fn_1 = </a:t>
+            </a:r>
+            <a:r>
+              <a:rPr lang="de-DE" sz="1900" dirty="0" err="1" smtClean="0">
+                <a:solidFill>
+                  <a:schemeClr val="tx1"/>
+                </a:solidFill>
+                <a:latin typeface="Courier New" pitchFamily="49" charset="0"/>
+                <a:cs typeface="Courier New" pitchFamily="49" charset="0"/>
+              </a:rPr>
+              <a:t>fn</a:t>
             </a:r>
             <a:r>
               <a:rPr lang="de-DE" sz="1900" dirty="0" smtClean="0">
@@ -18941,7 +18949,7 @@
                 <a:latin typeface="Courier New" pitchFamily="49" charset="0"/>
                 <a:cs typeface="Courier New" pitchFamily="49" charset="0"/>
               </a:rPr>
-              <a:t> fn_1 = 1;  %Wert für f(n-1)</a:t>
+              <a:t>;</a:t>
             </a:r>
           </a:p>
           <a:p>
@@ -18956,272 +18964,7 @@
                 <a:latin typeface="Courier New" pitchFamily="49" charset="0"/>
                 <a:cs typeface="Courier New" pitchFamily="49" charset="0"/>
               </a:rPr>
-              <a:t> </a:t>
-            </a:r>
-            <a:r>
-              <a:rPr lang="de-DE" sz="1900" dirty="0" smtClean="0">
-                <a:solidFill>
-                  <a:schemeClr val="tx1"/>
-                </a:solidFill>
-                <a:latin typeface="Courier New" pitchFamily="49" charset="0"/>
-                <a:cs typeface="Courier New" pitchFamily="49" charset="0"/>
-              </a:rPr>
-              <a:t> </a:t>
-            </a:r>
-            <a:r>
-              <a:rPr lang="de-DE" sz="1900" dirty="0" err="1" smtClean="0">
-                <a:solidFill>
-                  <a:schemeClr val="tx1"/>
-                </a:solidFill>
-                <a:latin typeface="Courier New" pitchFamily="49" charset="0"/>
-                <a:cs typeface="Courier New" pitchFamily="49" charset="0"/>
-              </a:rPr>
-              <a:t>for</a:t>
-            </a:r>
-            <a:r>
-              <a:rPr lang="de-DE" sz="1900" dirty="0" smtClean="0">
-                <a:solidFill>
-                  <a:schemeClr val="tx1"/>
-                </a:solidFill>
-                <a:latin typeface="Courier New" pitchFamily="49" charset="0"/>
-                <a:cs typeface="Courier New" pitchFamily="49" charset="0"/>
-              </a:rPr>
-              <a:t> </a:t>
-            </a:r>
-            <a:r>
-              <a:rPr lang="de-DE" sz="1900" dirty="0" err="1" smtClean="0">
-                <a:solidFill>
-                  <a:schemeClr val="tx1"/>
-                </a:solidFill>
-                <a:latin typeface="Courier New" pitchFamily="49" charset="0"/>
-                <a:cs typeface="Courier New" pitchFamily="49" charset="0"/>
-              </a:rPr>
-              <a:t>zaehler</a:t>
-            </a:r>
-            <a:r>
-              <a:rPr lang="de-DE" sz="1900" dirty="0" smtClean="0">
-                <a:solidFill>
-                  <a:schemeClr val="tx1"/>
-                </a:solidFill>
-                <a:latin typeface="Courier New" pitchFamily="49" charset="0"/>
-                <a:cs typeface="Courier New" pitchFamily="49" charset="0"/>
-              </a:rPr>
-              <a:t> = 2 : +1 : n</a:t>
-            </a:r>
-          </a:p>
-          <a:p>
-            <a:pPr>
-              <a:buNone/>
-            </a:pPr>
-            <a:r>
-              <a:rPr lang="de-DE" sz="1900" dirty="0" smtClean="0">
-                <a:solidFill>
-                  <a:schemeClr val="tx1"/>
-                </a:solidFill>
-                <a:latin typeface="Courier New" pitchFamily="49" charset="0"/>
-                <a:cs typeface="Courier New" pitchFamily="49" charset="0"/>
-              </a:rPr>
-              <a:t> </a:t>
-            </a:r>
-            <a:r>
-              <a:rPr lang="de-DE" sz="1900" dirty="0" smtClean="0">
-                <a:solidFill>
-                  <a:schemeClr val="tx1"/>
-                </a:solidFill>
-                <a:latin typeface="Courier New" pitchFamily="49" charset="0"/>
-                <a:cs typeface="Courier New" pitchFamily="49" charset="0"/>
-              </a:rPr>
-              <a:t>   </a:t>
-            </a:r>
-            <a:r>
-              <a:rPr lang="de-DE" sz="1900" dirty="0" err="1" smtClean="0">
-                <a:solidFill>
-                  <a:schemeClr val="tx1"/>
-                </a:solidFill>
-                <a:latin typeface="Courier New" pitchFamily="49" charset="0"/>
-                <a:cs typeface="Courier New" pitchFamily="49" charset="0"/>
-              </a:rPr>
-              <a:t>fn</a:t>
-            </a:r>
-            <a:r>
-              <a:rPr lang="de-DE" sz="1900" dirty="0" smtClean="0">
-                <a:solidFill>
-                  <a:schemeClr val="tx1"/>
-                </a:solidFill>
-                <a:latin typeface="Courier New" pitchFamily="49" charset="0"/>
-                <a:cs typeface="Courier New" pitchFamily="49" charset="0"/>
-              </a:rPr>
-              <a:t> = fn_2 + fn_1;</a:t>
-            </a:r>
-          </a:p>
-          <a:p>
-            <a:pPr>
-              <a:buNone/>
-            </a:pPr>
-            <a:r>
-              <a:rPr lang="de-DE" sz="1900" dirty="0" smtClean="0">
-                <a:solidFill>
-                  <a:schemeClr val="tx1"/>
-                </a:solidFill>
-                <a:latin typeface="Courier New" pitchFamily="49" charset="0"/>
-                <a:cs typeface="Courier New" pitchFamily="49" charset="0"/>
-              </a:rPr>
-              <a:t> </a:t>
-            </a:r>
-            <a:r>
-              <a:rPr lang="de-DE" sz="1900" dirty="0" smtClean="0">
-                <a:solidFill>
-                  <a:schemeClr val="tx1"/>
-                </a:solidFill>
-                <a:latin typeface="Courier New" pitchFamily="49" charset="0"/>
-                <a:cs typeface="Courier New" pitchFamily="49" charset="0"/>
-              </a:rPr>
-              <a:t>   </a:t>
-            </a:r>
-            <a:r>
-              <a:rPr lang="de-DE" sz="1900" dirty="0" err="1" smtClean="0">
-                <a:solidFill>
-                  <a:schemeClr val="tx1"/>
-                </a:solidFill>
-                <a:latin typeface="Courier New" pitchFamily="49" charset="0"/>
-                <a:cs typeface="Courier New" pitchFamily="49" charset="0"/>
-              </a:rPr>
-              <a:t>disp</a:t>
-            </a:r>
-            <a:r>
-              <a:rPr lang="de-DE" sz="1900" dirty="0" smtClean="0">
-                <a:solidFill>
-                  <a:schemeClr val="tx1"/>
-                </a:solidFill>
-                <a:latin typeface="Courier New" pitchFamily="49" charset="0"/>
-                <a:cs typeface="Courier New" pitchFamily="49" charset="0"/>
-              </a:rPr>
-              <a:t>(</a:t>
-            </a:r>
-            <a:r>
-              <a:rPr lang="de-DE" sz="1900" dirty="0" err="1" smtClean="0">
-                <a:solidFill>
-                  <a:schemeClr val="tx1"/>
-                </a:solidFill>
-                <a:latin typeface="Courier New" pitchFamily="49" charset="0"/>
-                <a:cs typeface="Courier New" pitchFamily="49" charset="0"/>
-              </a:rPr>
-              <a:t>fn</a:t>
-            </a:r>
-            <a:r>
-              <a:rPr lang="de-DE" sz="1900" dirty="0" smtClean="0">
-                <a:solidFill>
-                  <a:schemeClr val="tx1"/>
-                </a:solidFill>
-                <a:latin typeface="Courier New" pitchFamily="49" charset="0"/>
-                <a:cs typeface="Courier New" pitchFamily="49" charset="0"/>
-              </a:rPr>
-              <a:t>);</a:t>
-            </a:r>
-          </a:p>
-          <a:p>
-            <a:pPr>
-              <a:buNone/>
-            </a:pPr>
-            <a:r>
-              <a:rPr lang="de-DE" sz="1900" dirty="0" smtClean="0">
-                <a:solidFill>
-                  <a:schemeClr val="tx1"/>
-                </a:solidFill>
-                <a:latin typeface="Courier New" pitchFamily="49" charset="0"/>
-                <a:cs typeface="Courier New" pitchFamily="49" charset="0"/>
-              </a:rPr>
-              <a:t> </a:t>
-            </a:r>
-            <a:r>
-              <a:rPr lang="de-DE" sz="1900" dirty="0" smtClean="0">
-                <a:solidFill>
-                  <a:schemeClr val="tx1"/>
-                </a:solidFill>
-                <a:latin typeface="Courier New" pitchFamily="49" charset="0"/>
-                <a:cs typeface="Courier New" pitchFamily="49" charset="0"/>
-              </a:rPr>
-              <a:t>   fn_2 = fn_1;</a:t>
-            </a:r>
-          </a:p>
-          <a:p>
-            <a:pPr>
-              <a:buNone/>
-            </a:pPr>
-            <a:r>
-              <a:rPr lang="de-DE" sz="1900" dirty="0" smtClean="0">
-                <a:solidFill>
-                  <a:schemeClr val="tx1"/>
-                </a:solidFill>
-                <a:latin typeface="Courier New" pitchFamily="49" charset="0"/>
-                <a:cs typeface="Courier New" pitchFamily="49" charset="0"/>
-              </a:rPr>
-              <a:t> </a:t>
-            </a:r>
-            <a:r>
-              <a:rPr lang="de-DE" sz="1900" dirty="0" smtClean="0">
-                <a:solidFill>
-                  <a:schemeClr val="tx1"/>
-                </a:solidFill>
-                <a:latin typeface="Courier New" pitchFamily="49" charset="0"/>
-                <a:cs typeface="Courier New" pitchFamily="49" charset="0"/>
-              </a:rPr>
-              <a:t>   fn_1 = </a:t>
-            </a:r>
-            <a:r>
-              <a:rPr lang="de-DE" sz="1900" dirty="0" err="1" smtClean="0">
-                <a:solidFill>
-                  <a:schemeClr val="tx1"/>
-                </a:solidFill>
-                <a:latin typeface="Courier New" pitchFamily="49" charset="0"/>
-                <a:cs typeface="Courier New" pitchFamily="49" charset="0"/>
-              </a:rPr>
-              <a:t>fn</a:t>
-            </a:r>
-            <a:r>
-              <a:rPr lang="de-DE" sz="1900" dirty="0" smtClean="0">
-                <a:solidFill>
-                  <a:schemeClr val="tx1"/>
-                </a:solidFill>
-                <a:latin typeface="Courier New" pitchFamily="49" charset="0"/>
-                <a:cs typeface="Courier New" pitchFamily="49" charset="0"/>
-              </a:rPr>
-              <a:t>;</a:t>
-            </a:r>
-          </a:p>
-          <a:p>
-            <a:pPr>
-              <a:buNone/>
-            </a:pPr>
-            <a:r>
-              <a:rPr lang="de-DE" sz="1900" dirty="0" smtClean="0">
-                <a:solidFill>
-                  <a:schemeClr val="tx1"/>
-                </a:solidFill>
-                <a:latin typeface="Courier New" pitchFamily="49" charset="0"/>
-                <a:cs typeface="Courier New" pitchFamily="49" charset="0"/>
-              </a:rPr>
-              <a:t> </a:t>
-            </a:r>
-            <a:r>
-              <a:rPr lang="de-DE" sz="1900" dirty="0" smtClean="0">
-                <a:solidFill>
-                  <a:schemeClr val="tx1"/>
-                </a:solidFill>
-                <a:latin typeface="Courier New" pitchFamily="49" charset="0"/>
-                <a:cs typeface="Courier New" pitchFamily="49" charset="0"/>
-              </a:rPr>
-              <a:t> e</a:t>
-            </a:r>
-            <a:r>
-              <a:rPr lang="de-DE" sz="1900" dirty="0" smtClean="0">
-                <a:solidFill>
-                  <a:schemeClr val="tx1"/>
-                </a:solidFill>
-                <a:latin typeface="Courier New" pitchFamily="49" charset="0"/>
-                <a:cs typeface="Courier New" pitchFamily="49" charset="0"/>
-              </a:rPr>
-              <a:t>nd</a:t>
+              <a:t>  end</a:t>
             </a:r>
           </a:p>
           <a:p>
@@ -20155,7 +19898,7 @@
             <a:fld id="{B290341C-E875-4520-B517-C147063C318B}" type="datetime1">
               <a:rPr lang="de-DE" smtClean="0"/>
               <a:pPr/>
-              <a:t>18.05.2014</a:t>
+              <a:t>22.05.2014</a:t>
             </a:fld>
             <a:endParaRPr lang="de-DE" dirty="0"/>
           </a:p>
@@ -20396,7 +20139,17 @@
                 <a:latin typeface="Courier New" pitchFamily="49" charset="0"/>
                 <a:cs typeface="Courier New" pitchFamily="49" charset="0"/>
               </a:rPr>
-              <a:t> </a:t>
+              <a:t>  </a:t>
+            </a:r>
+            <a:r>
+              <a:rPr lang="de-DE" sz="2000" dirty="0" err="1" smtClean="0">
+                <a:solidFill>
+                  <a:schemeClr val="tx1"/>
+                </a:solidFill>
+                <a:latin typeface="Courier New" pitchFamily="49" charset="0"/>
+                <a:cs typeface="Courier New" pitchFamily="49" charset="0"/>
+              </a:rPr>
+              <a:t>fn</a:t>
             </a:r>
             <a:r>
               <a:rPr lang="de-DE" sz="2000" dirty="0" smtClean="0">
@@ -20406,7 +20159,22 @@
                 <a:latin typeface="Courier New" pitchFamily="49" charset="0"/>
                 <a:cs typeface="Courier New" pitchFamily="49" charset="0"/>
               </a:rPr>
-              <a:t> </a:t>
+              <a:t> = fn_2 + fn_1;</a:t>
+            </a:r>
+          </a:p>
+          <a:p>
+            <a:pPr>
+              <a:buNone/>
+            </a:pPr>
+            <a:r>
+              <a:rPr lang="de-DE" sz="2000" dirty="0" smtClean="0">
+                <a:solidFill>
+                  <a:schemeClr val="tx1"/>
+                </a:solidFill>
+                <a:latin typeface="Courier New" pitchFamily="49" charset="0"/>
+                <a:cs typeface="Courier New" pitchFamily="49" charset="0"/>
+              </a:rPr>
+              <a:t>  </a:t>
             </a:r>
             <a:r>
               <a:rPr lang="de-DE" sz="2000" dirty="0" err="1" smtClean="0">
@@ -20416,6 +20184,26 @@
                 <a:latin typeface="Courier New" pitchFamily="49" charset="0"/>
                 <a:cs typeface="Courier New" pitchFamily="49" charset="0"/>
               </a:rPr>
+              <a:t>disp</a:t>
+            </a:r>
+            <a:r>
+              <a:rPr lang="de-DE" sz="2000" dirty="0" smtClean="0">
+                <a:solidFill>
+                  <a:schemeClr val="tx1"/>
+                </a:solidFill>
+                <a:latin typeface="Courier New" pitchFamily="49" charset="0"/>
+                <a:cs typeface="Courier New" pitchFamily="49" charset="0"/>
+              </a:rPr>
+              <a:t>(</a:t>
+            </a:r>
+            <a:r>
+              <a:rPr lang="de-DE" sz="2000" dirty="0" err="1" smtClean="0">
+                <a:solidFill>
+                  <a:schemeClr val="tx1"/>
+                </a:solidFill>
+                <a:latin typeface="Courier New" pitchFamily="49" charset="0"/>
+                <a:cs typeface="Courier New" pitchFamily="49" charset="0"/>
+              </a:rPr>
               <a:t>fn</a:t>
             </a:r>
             <a:r>
@@ -20426,7 +20214,7 @@
                 <a:latin typeface="Courier New" pitchFamily="49" charset="0"/>
                 <a:cs typeface="Courier New" pitchFamily="49" charset="0"/>
               </a:rPr>
-              <a:t> = fn_2 + fn_1;</a:t>
+              <a:t>);</a:t>
             </a:r>
           </a:p>
           <a:p>
@@ -20441,8 +20229,13 @@
                 <a:latin typeface="Courier New" pitchFamily="49" charset="0"/>
                 <a:cs typeface="Courier New" pitchFamily="49" charset="0"/>
               </a:rPr>
-              <a:t> </a:t>
-            </a:r>
+              <a:t>  fn_2 = fn_1;</a:t>
+            </a:r>
+          </a:p>
+          <a:p>
+            <a:pPr>
+              <a:buNone/>
+            </a:pPr>
             <a:r>
               <a:rPr lang="de-DE" sz="2000" dirty="0" smtClean="0">
                 <a:solidFill>
@@ -20451,97 +20244,7 @@
                 <a:latin typeface="Courier New" pitchFamily="49" charset="0"/>
                 <a:cs typeface="Courier New" pitchFamily="49" charset="0"/>
               </a:rPr>
-              <a:t> </a:t>
-            </a:r>
-            <a:r>
-              <a:rPr lang="de-DE" sz="2000" dirty="0" err="1" smtClean="0">
-                <a:solidFill>
-                  <a:schemeClr val="tx1"/>
-                </a:solidFill>
-                <a:latin typeface="Courier New" pitchFamily="49" charset="0"/>
-                <a:cs typeface="Courier New" pitchFamily="49" charset="0"/>
-              </a:rPr>
-              <a:t>disp</a:t>
-            </a:r>
-            <a:r>
-              <a:rPr lang="de-DE" sz="2000" dirty="0" smtClean="0">
-                <a:solidFill>
-                  <a:schemeClr val="tx1"/>
-                </a:solidFill>
-                <a:latin typeface="Courier New" pitchFamily="49" charset="0"/>
-                <a:cs typeface="Courier New" pitchFamily="49" charset="0"/>
-              </a:rPr>
-              <a:t>(</a:t>
-            </a:r>
-            <a:r>
-              <a:rPr lang="de-DE" sz="2000" dirty="0" err="1" smtClean="0">
-                <a:solidFill>
-                  <a:schemeClr val="tx1"/>
-                </a:solidFill>
-                <a:latin typeface="Courier New" pitchFamily="49" charset="0"/>
-                <a:cs typeface="Courier New" pitchFamily="49" charset="0"/>
-              </a:rPr>
-              <a:t>fn</a:t>
-            </a:r>
-            <a:r>
-              <a:rPr lang="de-DE" sz="2000" dirty="0" smtClean="0">
-                <a:solidFill>
-                  <a:schemeClr val="tx1"/>
-                </a:solidFill>
-                <a:latin typeface="Courier New" pitchFamily="49" charset="0"/>
-                <a:cs typeface="Courier New" pitchFamily="49" charset="0"/>
-              </a:rPr>
-              <a:t>);</a:t>
-            </a:r>
-          </a:p>
-          <a:p>
-            <a:pPr>
-              <a:buNone/>
-            </a:pPr>
-            <a:r>
-              <a:rPr lang="de-DE" sz="2000" dirty="0" smtClean="0">
-                <a:solidFill>
-                  <a:schemeClr val="tx1"/>
-                </a:solidFill>
-                <a:latin typeface="Courier New" pitchFamily="49" charset="0"/>
-                <a:cs typeface="Courier New" pitchFamily="49" charset="0"/>
-              </a:rPr>
-              <a:t> </a:t>
-            </a:r>
-            <a:r>
-              <a:rPr lang="de-DE" sz="2000" dirty="0" smtClean="0">
-                <a:solidFill>
-                  <a:schemeClr val="tx1"/>
-                </a:solidFill>
-                <a:latin typeface="Courier New" pitchFamily="49" charset="0"/>
-                <a:cs typeface="Courier New" pitchFamily="49" charset="0"/>
-              </a:rPr>
-              <a:t> fn_2 = fn_1;</a:t>
-            </a:r>
-          </a:p>
-          <a:p>
-            <a:pPr>
-              <a:buNone/>
-            </a:pPr>
-            <a:r>
-              <a:rPr lang="de-DE" sz="2000" dirty="0" smtClean="0">
-                <a:solidFill>
-                  <a:schemeClr val="tx1"/>
-                </a:solidFill>
-                <a:latin typeface="Courier New" pitchFamily="49" charset="0"/>
-                <a:cs typeface="Courier New" pitchFamily="49" charset="0"/>
-              </a:rPr>
-              <a:t> </a:t>
-            </a:r>
-            <a:r>
-              <a:rPr lang="de-DE" sz="2000" dirty="0" smtClean="0">
-                <a:solidFill>
-                  <a:schemeClr val="tx1"/>
-                </a:solidFill>
-                <a:latin typeface="Courier New" pitchFamily="49" charset="0"/>
-                <a:cs typeface="Courier New" pitchFamily="49" charset="0"/>
-              </a:rPr>
-              <a:t> fn_1 = </a:t>
+              <a:t>  fn_1 = </a:t>
             </a:r>
             <a:r>
               <a:rPr lang="de-DE" sz="2000" dirty="0" err="1" smtClean="0">
@@ -20823,7 +20526,7 @@
             <a:fld id="{0DE10BCB-7336-4759-BC0F-6F24C7137092}" type="datetime1">
               <a:rPr lang="de-DE" smtClean="0"/>
               <a:pPr/>
-              <a:t>18.05.2014</a:t>
+              <a:t>22.05.2014</a:t>
             </a:fld>
             <a:endParaRPr lang="de-DE" dirty="0"/>
           </a:p>
@@ -21106,7 +20809,7 @@
             <a:fld id="{0DE10BCB-7336-4759-BC0F-6F24C7137092}" type="datetime1">
               <a:rPr lang="de-DE" smtClean="0"/>
               <a:pPr/>
-              <a:t>18.05.2014</a:t>
+              <a:t>22.05.2014</a:t>
             </a:fld>
             <a:endParaRPr lang="de-DE" dirty="0"/>
           </a:p>
@@ -21310,7 +21013,7 @@
             <a:fld id="{0DE10BCB-7336-4759-BC0F-6F24C7137092}" type="datetime1">
               <a:rPr lang="de-DE" smtClean="0"/>
               <a:pPr/>
-              <a:t>18.05.2014</a:t>
+              <a:t>22.05.2014</a:t>
             </a:fld>
             <a:endParaRPr lang="de-DE" dirty="0"/>
           </a:p>
@@ -21528,7 +21231,7 @@
             <a:fld id="{0DE10BCB-7336-4759-BC0F-6F24C7137092}" type="datetime1">
               <a:rPr lang="de-DE" smtClean="0"/>
               <a:pPr/>
-              <a:t>18.05.2014</a:t>
+              <a:t>22.05.2014</a:t>
             </a:fld>
             <a:endParaRPr lang="de-DE" dirty="0"/>
           </a:p>
@@ -21639,7 +21342,19 @@
           <a:p>
             <a:r>
               <a:rPr lang="de-DE" dirty="0" smtClean="0"/>
-              <a:t>F = A &amp; B</a:t>
+              <a:t>F = </a:t>
+            </a:r>
+            <a:r>
+              <a:rPr lang="de-DE" smtClean="0"/>
+              <a:t>A </a:t>
+            </a:r>
+            <a:r>
+              <a:rPr lang="de-DE" smtClean="0"/>
+              <a:t>&amp;&amp; </a:t>
+            </a:r>
+            <a:r>
+              <a:rPr lang="de-DE" dirty="0" smtClean="0"/>
+              <a:t>B</a:t>
             </a:r>
           </a:p>
           <a:p>
@@ -21730,7 +21445,7 @@
             <a:fld id="{0DE10BCB-7336-4759-BC0F-6F24C7137092}" type="datetime1">
               <a:rPr lang="de-DE" smtClean="0"/>
               <a:pPr/>
-              <a:t>18.05.2014</a:t>
+              <a:t>22.05.2014</a:t>
             </a:fld>
             <a:endParaRPr lang="de-DE" dirty="0"/>
           </a:p>

</xml_diff>